<commit_message>
opravy chyb a formulací, přeskupení snímků (o řešeních při překrývání struktur)
</commit_message>
<xml_diff>
--- a/Presentations/02-RIDICS_Zaklady-XML-TEI-XML.pptx
+++ b/Presentations/02-RIDICS_Zaklady-XML-TEI-XML.pptx
@@ -17,11 +17,11 @@
     <p:sldId id="258" r:id="rId5"/>
     <p:sldId id="259" r:id="rId6"/>
     <p:sldId id="269" r:id="rId7"/>
-    <p:sldId id="276" r:id="rId8"/>
-    <p:sldId id="277" r:id="rId9"/>
-    <p:sldId id="260" r:id="rId10"/>
-    <p:sldId id="262" r:id="rId11"/>
-    <p:sldId id="268" r:id="rId12"/>
+    <p:sldId id="260" r:id="rId8"/>
+    <p:sldId id="262" r:id="rId9"/>
+    <p:sldId id="268" r:id="rId10"/>
+    <p:sldId id="276" r:id="rId11"/>
+    <p:sldId id="277" r:id="rId12"/>
     <p:sldId id="264" r:id="rId13"/>
     <p:sldId id="265" r:id="rId14"/>
     <p:sldId id="285" r:id="rId15"/>
@@ -278,7 +278,7 @@
           <a:p>
             <a:fld id="{693D0AAB-BC65-4D93-BE30-329DE1D7C511}" type="datetimeFigureOut">
               <a:rPr lang="cs-CZ" smtClean="0"/>
-              <a:t>06.05.2019</a:t>
+              <a:t>09.05.2019</a:t>
             </a:fld>
             <a:endParaRPr lang="cs-CZ" dirty="0"/>
           </a:p>
@@ -387,7 +387,7 @@
           <a:p>
             <a:fld id="{BF6F0682-C2CD-439F-BD5E-D51593A61157}" type="datetimeFigureOut">
               <a:rPr lang="cs-CZ" smtClean="0"/>
-              <a:t>06.05.2019</a:t>
+              <a:t>09.05.2019</a:t>
             </a:fld>
             <a:endParaRPr lang="cs-CZ" dirty="0"/>
           </a:p>
@@ -4914,7 +4914,7 @@
           <p:cNvPr id="2" name="Nadpis 1">
             <a:extLst>
               <a:ext uri="{FF2B5EF4-FFF2-40B4-BE49-F238E27FC236}">
-                <a16:creationId xmlns:a16="http://schemas.microsoft.com/office/drawing/2014/main" id="{AA2FD737-6EF6-4588-8139-9D80FBB00749}"/>
+                <a16:creationId xmlns:a16="http://schemas.microsoft.com/office/drawing/2014/main" id="{88C0DF56-9D1A-40D5-A414-F8466539FDDA}"/>
               </a:ext>
             </a:extLst>
           </p:cNvPr>
@@ -4932,61 +4932,28 @@
           <a:p>
             <a:r>
               <a:rPr lang="cs-CZ" dirty="0"/>
-              <a:t>Základní části dokumentu XML, atributy II</a:t>
-            </a:r>
-          </a:p>
-        </p:txBody>
-      </p:sp>
-      <p:sp>
-        <p:nvSpPr>
-          <p:cNvPr id="3" name="Zástupný text 2">
-            <a:extLst>
-              <a:ext uri="{FF2B5EF4-FFF2-40B4-BE49-F238E27FC236}">
-                <a16:creationId xmlns:a16="http://schemas.microsoft.com/office/drawing/2014/main" id="{EAE0A3D3-6250-4BED-8697-E2A10239BA10}"/>
-              </a:ext>
-            </a:extLst>
-          </p:cNvPr>
-          <p:cNvSpPr>
-            <a:spLocks noGrp="1"/>
-          </p:cNvSpPr>
-          <p:nvPr>
-            <p:ph type="body" idx="1"/>
-          </p:nvPr>
-        </p:nvSpPr>
-        <p:spPr/>
-        <p:txBody>
-          <a:bodyPr/>
-          <a:lstStyle/>
-          <a:p>
-            <a:r>
-              <a:rPr lang="cs-CZ" dirty="0"/>
-              <a:t>atribut</a:t>
-            </a:r>
-          </a:p>
-        </p:txBody>
-      </p:sp>
-      <p:sp>
-        <p:nvSpPr>
-          <p:cNvPr id="4" name="Zástupný obsah 3">
-            <a:extLst>
-              <a:ext uri="{FF2B5EF4-FFF2-40B4-BE49-F238E27FC236}">
-                <a16:creationId xmlns:a16="http://schemas.microsoft.com/office/drawing/2014/main" id="{9A80166F-C925-4EAA-8A47-E3DF57FABDD4}"/>
-              </a:ext>
-            </a:extLst>
-          </p:cNvPr>
-          <p:cNvSpPr>
-            <a:spLocks noGrp="1"/>
-          </p:cNvSpPr>
-          <p:nvPr>
-            <p:ph sz="half" idx="2"/>
-          </p:nvPr>
-        </p:nvSpPr>
-        <p:spPr>
-          <a:xfrm>
-            <a:off x="360000" y="2505074"/>
-            <a:ext cx="5637575" cy="3789399"/>
-          </a:xfrm>
-        </p:spPr>
+              <a:t>Jak řešit (ne)překrývání elementů v XML TEI</a:t>
+            </a:r>
+          </a:p>
+        </p:txBody>
+      </p:sp>
+      <p:sp>
+        <p:nvSpPr>
+          <p:cNvPr id="7" name="Zástupný obsah 6">
+            <a:extLst>
+              <a:ext uri="{FF2B5EF4-FFF2-40B4-BE49-F238E27FC236}">
+                <a16:creationId xmlns:a16="http://schemas.microsoft.com/office/drawing/2014/main" id="{D7E19EBE-0E3E-4325-AFE1-235A5E15B272}"/>
+              </a:ext>
+            </a:extLst>
+          </p:cNvPr>
+          <p:cNvSpPr>
+            <a:spLocks noGrp="1"/>
+          </p:cNvSpPr>
+          <p:nvPr>
+            <p:ph idx="1"/>
+          </p:nvPr>
+        </p:nvSpPr>
+        <p:spPr/>
         <p:txBody>
           <a:bodyPr>
             <a:normAutofit/>
@@ -4995,184 +4962,77 @@
           <a:p>
             <a:r>
               <a:rPr lang="cs-CZ" dirty="0"/>
-              <a:t>v rámci 1 elementu nelze mít více atributů se stejným názvem</a:t>
-            </a:r>
-          </a:p>
-          <a:p>
-            <a:r>
-              <a:rPr lang="cs-CZ" dirty="0"/>
-              <a:t>hodnota </a:t>
-            </a:r>
-          </a:p>
-          <a:p>
-            <a:pPr lvl="1"/>
-            <a:r>
-              <a:rPr lang="cs-CZ" dirty="0"/>
-              <a:t>může obsahovat libovolný text (včetně mezer)</a:t>
-            </a:r>
-          </a:p>
-          <a:p>
-            <a:pPr lvl="1"/>
-            <a:r>
-              <a:rPr lang="cs-CZ" dirty="0"/>
-              <a:t>nemůže obsahovat element</a:t>
-            </a:r>
-          </a:p>
-          <a:p>
-            <a:pPr lvl="1"/>
-            <a:r>
-              <a:rPr lang="cs-CZ" dirty="0"/>
-              <a:t>vyhrazené znaky se vkládají</a:t>
-            </a:r>
-          </a:p>
-          <a:p>
-            <a:pPr lvl="2"/>
-            <a:r>
-              <a:rPr lang="cs-CZ" dirty="0"/>
-              <a:t>pomocí entity: &amp;</a:t>
-            </a:r>
-            <a:r>
-              <a:rPr lang="cs-CZ" dirty="0" err="1"/>
-              <a:t>apos</a:t>
-            </a:r>
-            <a:r>
-              <a:rPr lang="cs-CZ" dirty="0"/>
-              <a:t>; ('), &amp;</a:t>
-            </a:r>
-            <a:r>
-              <a:rPr lang="cs-CZ" dirty="0" err="1"/>
-              <a:t>quot</a:t>
-            </a:r>
-            <a:r>
-              <a:rPr lang="cs-CZ" dirty="0"/>
-              <a:t>; ("), &amp;</a:t>
-            </a:r>
-            <a:r>
-              <a:rPr lang="cs-CZ" dirty="0" err="1"/>
-              <a:t>lt</a:t>
-            </a:r>
-            <a:r>
-              <a:rPr lang="cs-CZ" dirty="0"/>
-              <a:t>; (&lt;), &amp;</a:t>
-            </a:r>
-            <a:r>
-              <a:rPr lang="cs-CZ" dirty="0" err="1"/>
-              <a:t>gt</a:t>
-            </a:r>
-            <a:r>
-              <a:rPr lang="cs-CZ" dirty="0"/>
-              <a:t>; (&gt;), &amp;</a:t>
-            </a:r>
-            <a:r>
-              <a:rPr lang="cs-CZ" dirty="0" err="1"/>
-              <a:t>amp</a:t>
-            </a:r>
-            <a:r>
-              <a:rPr lang="cs-CZ" dirty="0"/>
-              <a:t>; (&amp;)</a:t>
-            </a:r>
-          </a:p>
-          <a:p>
-            <a:pPr lvl="1"/>
-            <a:endParaRPr lang="cs-CZ" dirty="0"/>
-          </a:p>
-          <a:p>
-            <a:endParaRPr lang="cs-CZ" dirty="0"/>
-          </a:p>
-        </p:txBody>
-      </p:sp>
-      <p:sp>
-        <p:nvSpPr>
-          <p:cNvPr id="5" name="Zástupný text 4">
-            <a:extLst>
-              <a:ext uri="{FF2B5EF4-FFF2-40B4-BE49-F238E27FC236}">
-                <a16:creationId xmlns:a16="http://schemas.microsoft.com/office/drawing/2014/main" id="{D8020493-0E1F-4321-B419-AFA9675C64A2}"/>
-              </a:ext>
-            </a:extLst>
-          </p:cNvPr>
-          <p:cNvSpPr>
-            <a:spLocks noGrp="1"/>
-          </p:cNvSpPr>
-          <p:nvPr>
-            <p:ph type="body" sz="quarter" idx="3"/>
-          </p:nvPr>
-        </p:nvSpPr>
-        <p:spPr/>
-        <p:txBody>
-          <a:bodyPr/>
-          <a:lstStyle/>
-          <a:p>
-            <a:r>
-              <a:rPr lang="cs-CZ" dirty="0"/>
-              <a:t>příklady</a:t>
-            </a:r>
-          </a:p>
-        </p:txBody>
-      </p:sp>
-      <p:sp>
-        <p:nvSpPr>
-          <p:cNvPr id="6" name="Zástupný obsah 5">
-            <a:extLst>
-              <a:ext uri="{FF2B5EF4-FFF2-40B4-BE49-F238E27FC236}">
-                <a16:creationId xmlns:a16="http://schemas.microsoft.com/office/drawing/2014/main" id="{A91A591C-FFF8-4B18-964E-898DFB42E536}"/>
-              </a:ext>
-            </a:extLst>
-          </p:cNvPr>
-          <p:cNvSpPr>
-            <a:spLocks noGrp="1"/>
-          </p:cNvSpPr>
-          <p:nvPr>
-            <p:ph sz="quarter" idx="4"/>
-          </p:nvPr>
-        </p:nvSpPr>
-        <p:spPr>
-          <a:xfrm>
-            <a:off x="6096000" y="2505075"/>
-            <a:ext cx="5755200" cy="3789398"/>
-          </a:xfrm>
-        </p:spPr>
-        <p:txBody>
-          <a:bodyPr>
-            <a:normAutofit/>
-          </a:bodyPr>
-          <a:lstStyle/>
-          <a:p>
-            <a:pPr>
+              <a:t>hranice strany nebo sloupce (podobně biblické knihy, kapitoly a verše)</a:t>
+            </a:r>
+          </a:p>
+          <a:p>
+            <a:pPr lvl="1">
               <a:buFont typeface="Wingdings" panose="05000000000000000000" pitchFamily="2" charset="2"/>
               <a:buChar char="v"/>
             </a:pPr>
             <a:r>
+              <a:rPr lang="cs-CZ" dirty="0"/>
+              <a:t>&lt;p&gt;Text odstavce &lt;</a:t>
+            </a:r>
+            <a:r>
+              <a:rPr lang="cs-CZ" dirty="0" err="1"/>
+              <a:t>pb</a:t>
+            </a:r>
+            <a:r>
+              <a:rPr lang="cs-CZ" dirty="0"/>
+              <a:t> n="</a:t>
+            </a:r>
+            <a:r>
+              <a:rPr lang="cs-CZ" dirty="0" err="1"/>
+              <a:t>23r</a:t>
+            </a:r>
+            <a:r>
+              <a:rPr lang="cs-CZ" dirty="0"/>
+              <a:t>"/&gt;pokračující na další stránce.&lt;/p&gt;</a:t>
+            </a:r>
+          </a:p>
+          <a:p>
+            <a:pPr lvl="2">
+              <a:buClr>
+                <a:srgbClr val="4472C4">
+                  <a:lumMod val="75000"/>
+                </a:srgbClr>
+              </a:buClr>
+            </a:pPr>
+            <a:r>
               <a:rPr lang="cs-CZ" dirty="0">
                 <a:solidFill>
-                  <a:srgbClr val="7030A0"/>
-                </a:solidFill>
-              </a:rPr>
-              <a:t>&lt;titul typ="hlavní" typ="knižní"&gt;Český snář&lt;/titul&gt; </a:t>
-            </a:r>
-            <a:r>
-              <a:rPr lang="cs-CZ" dirty="0">
-                <a:solidFill>
-                  <a:srgbClr val="7030A0"/>
-                </a:solidFill>
-                <a:sym typeface="Wingdings" panose="05000000000000000000" pitchFamily="2" charset="2"/>
-              </a:rPr>
-              <a:t></a:t>
-            </a:r>
-            <a:endParaRPr lang="cs-CZ" dirty="0">
-              <a:solidFill>
-                <a:srgbClr val="7030A0"/>
-              </a:solidFill>
-            </a:endParaRPr>
-          </a:p>
-          <a:p>
-            <a:pPr>
+                  <a:prstClr val="black"/>
+                </a:solidFill>
+              </a:rPr>
+              <a:t>použití prázdného elementu/prvku</a:t>
+            </a:r>
+          </a:p>
+          <a:p>
+            <a:r>
+              <a:rPr lang="cs-CZ" dirty="0"/>
+              <a:t>přímá řeč přes více odstavců</a:t>
+            </a:r>
+          </a:p>
+          <a:p>
+            <a:pPr lvl="1">
               <a:buFont typeface="Wingdings" panose="05000000000000000000" pitchFamily="2" charset="2"/>
               <a:buChar char="v"/>
             </a:pPr>
-            <a:endParaRPr lang="cs-CZ" dirty="0"/>
-          </a:p>
-          <a:p>
-            <a:pPr>
+            <a:r>
+              <a:rPr lang="cs-CZ" dirty="0"/>
+              <a:t>&lt;p&gt;„Text přímé řeči… konec odstavce.&lt;/p&gt;&lt;p&gt;Přímá řeč pokračuje…“&lt;/p&gt;</a:t>
+            </a:r>
+          </a:p>
+          <a:p>
+            <a:pPr lvl="2"/>
+            <a:r>
+              <a:rPr lang="cs-CZ" dirty="0"/>
+              <a:t>bez označení prvku pro přímou řeč</a:t>
+            </a:r>
+          </a:p>
+          <a:p>
+            <a:pPr lvl="1">
               <a:buFont typeface="Wingdings" panose="05000000000000000000" pitchFamily="2" charset="2"/>
               <a:buChar char="v"/>
             </a:pPr>
@@ -5182,136 +5042,127 @@
                   <a:srgbClr val="7030A0"/>
                 </a:solidFill>
               </a:rPr>
-              <a:t>&lt;titul překlad="&lt;</a:t>
-            </a:r>
-            <a:r>
-              <a:rPr lang="cs-CZ" dirty="0" err="1">
+              <a:t>&lt;p&gt;&lt;q&gt;„Text přímé řeči… konec odstavce.&lt;/p&gt;</a:t>
+            </a:r>
+            <a:br>
+              <a:rPr lang="cs-CZ" dirty="0">
                 <a:solidFill>
                   <a:srgbClr val="7030A0"/>
                 </a:solidFill>
               </a:rPr>
-              <a:t>title</a:t>
-            </a:r>
+            </a:br>
             <a:r>
               <a:rPr lang="cs-CZ" dirty="0">
                 <a:solidFill>
                   <a:srgbClr val="7030A0"/>
                 </a:solidFill>
               </a:rPr>
-              <a:t>&gt;</a:t>
-            </a:r>
-            <a:r>
-              <a:rPr lang="cs-CZ" dirty="0" err="1">
+              <a:t>&lt;p&gt;Přímá řeč pokračuje…“&lt;/q&gt;&lt;/p&gt; </a:t>
+            </a:r>
+            <a:r>
+              <a:rPr lang="cs-CZ" dirty="0">
                 <a:solidFill>
                   <a:srgbClr val="7030A0"/>
                 </a:solidFill>
-              </a:rPr>
-              <a:t>The</a:t>
-            </a:r>
-            <a:r>
-              <a:rPr lang="cs-CZ" dirty="0">
-                <a:solidFill>
-                  <a:srgbClr val="7030A0"/>
-                </a:solidFill>
-              </a:rPr>
-              <a:t> Czech </a:t>
-            </a:r>
-            <a:r>
-              <a:rPr lang="cs-CZ" dirty="0" err="1">
-                <a:solidFill>
-                  <a:srgbClr val="7030A0"/>
-                </a:solidFill>
-              </a:rPr>
-              <a:t>Dream</a:t>
-            </a:r>
-            <a:r>
-              <a:rPr lang="cs-CZ" dirty="0">
-                <a:solidFill>
-                  <a:srgbClr val="7030A0"/>
-                </a:solidFill>
-              </a:rPr>
-              <a:t> </a:t>
-            </a:r>
-            <a:r>
-              <a:rPr lang="cs-CZ" dirty="0" err="1">
-                <a:solidFill>
-                  <a:srgbClr val="7030A0"/>
-                </a:solidFill>
-              </a:rPr>
-              <a:t>Book</a:t>
-            </a:r>
-            <a:r>
-              <a:rPr lang="cs-CZ" dirty="0">
-                <a:solidFill>
-                  <a:srgbClr val="7030A0"/>
-                </a:solidFill>
-              </a:rPr>
-              <a:t>&lt;/</a:t>
-            </a:r>
-            <a:r>
-              <a:rPr lang="cs-CZ" dirty="0" err="1">
-                <a:solidFill>
-                  <a:srgbClr val="7030A0"/>
-                </a:solidFill>
-              </a:rPr>
-              <a:t>title</a:t>
-            </a:r>
-            <a:r>
-              <a:rPr lang="cs-CZ" dirty="0">
-                <a:solidFill>
-                  <a:srgbClr val="7030A0"/>
-                </a:solidFill>
-              </a:rPr>
-              <a:t>&gt;"&gt;Český snář&lt;/titul&gt; </a:t>
-            </a:r>
-            <a:r>
-              <a:rPr lang="cs-CZ" dirty="0">
-                <a:solidFill>
-                  <a:srgbClr val="7030A0"/>
-                </a:solidFill>
                 <a:sym typeface="Wingdings" panose="05000000000000000000" pitchFamily="2" charset="2"/>
               </a:rPr>
-              <a:t></a:t>
-            </a:r>
-            <a:endParaRPr lang="cs-CZ" dirty="0">
-              <a:solidFill>
-                <a:srgbClr val="7030A0"/>
-              </a:solidFill>
-            </a:endParaRPr>
-          </a:p>
-          <a:p>
-            <a:pPr>
+              <a:t> </a:t>
+            </a:r>
+          </a:p>
+          <a:p>
+            <a:pPr lvl="1">
               <a:buFont typeface="Wingdings" panose="05000000000000000000" pitchFamily="2" charset="2"/>
               <a:buChar char="v"/>
             </a:pPr>
             <a:r>
               <a:rPr lang="cs-CZ" dirty="0"/>
-              <a:t>&lt;titul varianta="Bc. &amp;</a:t>
+              <a:t>&lt;p&gt;&lt;q </a:t>
             </a:r>
             <a:r>
               <a:rPr lang="cs-CZ" dirty="0" err="1"/>
-              <a:t>amp</a:t>
-            </a:r>
-            <a:r>
-              <a:rPr lang="cs-CZ" dirty="0"/>
-              <a:t>; Mgr."&gt;Bc. et Mgr.&lt;/titul&gt;</a:t>
-            </a:r>
-          </a:p>
-          <a:p>
-            <a:pPr>
+              <a:t>xml:id</a:t>
+            </a:r>
+            <a:r>
+              <a:rPr lang="cs-CZ" dirty="0"/>
+              <a:t>="q-1" </a:t>
+            </a:r>
+            <a:r>
+              <a:rPr lang="cs-CZ" dirty="0" err="1"/>
+              <a:t>next</a:t>
+            </a:r>
+            <a:r>
+              <a:rPr lang="cs-CZ" dirty="0"/>
+              <a:t>="#q-2"&gt;„Text přímé řeči… konec odstavce.&lt;/q&gt;&lt;/p&gt;</a:t>
+            </a:r>
+            <a:br>
+              <a:rPr lang="cs-CZ" dirty="0"/>
+            </a:br>
+            <a:r>
+              <a:rPr lang="cs-CZ" dirty="0"/>
+              <a:t>&lt;p&gt;&lt;q </a:t>
+            </a:r>
+            <a:r>
+              <a:rPr lang="cs-CZ" dirty="0" err="1"/>
+              <a:t>xml:id</a:t>
+            </a:r>
+            <a:r>
+              <a:rPr lang="cs-CZ" dirty="0"/>
+              <a:t>="q-2" </a:t>
+            </a:r>
+            <a:r>
+              <a:rPr lang="cs-CZ" dirty="0" err="1"/>
+              <a:t>prev</a:t>
+            </a:r>
+            <a:r>
+              <a:rPr lang="cs-CZ" dirty="0"/>
+              <a:t>="#q-1"&gt;Přímá řeč pokračuje…“&lt;/q&gt;&lt;/p&gt; </a:t>
+            </a:r>
+            <a:r>
+              <a:rPr lang="cs-CZ" dirty="0">
+                <a:sym typeface="Wingdings" panose="05000000000000000000" pitchFamily="2" charset="2"/>
+              </a:rPr>
+              <a:t></a:t>
+            </a:r>
+          </a:p>
+          <a:p>
+            <a:pPr lvl="2">
+              <a:buClr>
+                <a:srgbClr val="4472C4">
+                  <a:lumMod val="75000"/>
+                </a:srgbClr>
+              </a:buClr>
+            </a:pPr>
+            <a:r>
+              <a:rPr lang="cs-CZ" dirty="0">
+                <a:solidFill>
+                  <a:prstClr val="black"/>
+                </a:solidFill>
+              </a:rPr>
+              <a:t>použití dvou prvků pro přímou řeč (&lt;q&gt;), návaznost se řeší pomocí odkazování mezi prvky</a:t>
+            </a:r>
+          </a:p>
+          <a:p>
+            <a:pPr lvl="1">
               <a:buFont typeface="Wingdings" panose="05000000000000000000" pitchFamily="2" charset="2"/>
               <a:buChar char="v"/>
             </a:pPr>
             <a:endParaRPr lang="cs-CZ" dirty="0"/>
           </a:p>
-        </p:txBody>
-      </p:sp>
-      <p:sp>
-        <p:nvSpPr>
-          <p:cNvPr id="7" name="Zástupný symbol pro datum 6">
-            <a:extLst>
-              <a:ext uri="{FF2B5EF4-FFF2-40B4-BE49-F238E27FC236}">
-                <a16:creationId xmlns:a16="http://schemas.microsoft.com/office/drawing/2014/main" id="{18E08B85-4550-4032-A594-4FB46CDE033C}"/>
+          <a:p>
+            <a:pPr lvl="1">
+              <a:buFont typeface="Wingdings" panose="05000000000000000000" pitchFamily="2" charset="2"/>
+              <a:buChar char="v"/>
+            </a:pPr>
+            <a:endParaRPr lang="cs-CZ" dirty="0"/>
+          </a:p>
+        </p:txBody>
+      </p:sp>
+      <p:sp>
+        <p:nvSpPr>
+          <p:cNvPr id="5" name="Zástupný symbol pro datum 4">
+            <a:extLst>
+              <a:ext uri="{FF2B5EF4-FFF2-40B4-BE49-F238E27FC236}">
+                <a16:creationId xmlns:a16="http://schemas.microsoft.com/office/drawing/2014/main" id="{1A74DB83-3FEF-4AD4-8396-17C1971463E9}"/>
               </a:ext>
             </a:extLst>
           </p:cNvPr>
@@ -5337,10 +5188,10 @@
       </p:sp>
       <p:sp>
         <p:nvSpPr>
-          <p:cNvPr id="8" name="Zástupný symbol pro číslo snímku 7">
-            <a:extLst>
-              <a:ext uri="{FF2B5EF4-FFF2-40B4-BE49-F238E27FC236}">
-                <a16:creationId xmlns:a16="http://schemas.microsoft.com/office/drawing/2014/main" id="{4E2C9467-A938-42DE-901E-A889A05A0C32}"/>
+          <p:cNvPr id="6" name="Zástupný symbol pro číslo snímku 5">
+            <a:extLst>
+              <a:ext uri="{FF2B5EF4-FFF2-40B4-BE49-F238E27FC236}">
+                <a16:creationId xmlns:a16="http://schemas.microsoft.com/office/drawing/2014/main" id="{E0D51FB8-709A-4C26-8BE3-DBD4EC0CF0AA}"/>
               </a:ext>
             </a:extLst>
           </p:cNvPr>
@@ -5366,10 +5217,10 @@
       </p:sp>
       <p:sp>
         <p:nvSpPr>
-          <p:cNvPr id="9" name="Zástupný symbol pro zápatí 8">
-            <a:extLst>
-              <a:ext uri="{FF2B5EF4-FFF2-40B4-BE49-F238E27FC236}">
-                <a16:creationId xmlns:a16="http://schemas.microsoft.com/office/drawing/2014/main" id="{3533B480-8B64-4355-BC56-7262BEFB9A03}"/>
+          <p:cNvPr id="3" name="Zástupný symbol pro zápatí 2">
+            <a:extLst>
+              <a:ext uri="{FF2B5EF4-FFF2-40B4-BE49-F238E27FC236}">
+                <a16:creationId xmlns:a16="http://schemas.microsoft.com/office/drawing/2014/main" id="{EF1886E8-1C30-4EC3-BD3C-BD23AE4AF3D9}"/>
               </a:ext>
             </a:extLst>
           </p:cNvPr>
@@ -5396,7 +5247,7 @@
     </p:spTree>
     <p:extLst>
       <p:ext uri="{BB962C8B-B14F-4D97-AF65-F5344CB8AC3E}">
-        <p14:creationId xmlns:p14="http://schemas.microsoft.com/office/powerpoint/2010/main" val="1053685828"/>
+        <p14:creationId xmlns:p14="http://schemas.microsoft.com/office/powerpoint/2010/main" val="996861646"/>
       </p:ext>
     </p:extLst>
   </p:cSld>
@@ -5425,10 +5276,10 @@
       </p:grpSpPr>
       <p:sp>
         <p:nvSpPr>
-          <p:cNvPr id="9" name="Nadpis 8">
-            <a:extLst>
-              <a:ext uri="{FF2B5EF4-FFF2-40B4-BE49-F238E27FC236}">
-                <a16:creationId xmlns:a16="http://schemas.microsoft.com/office/drawing/2014/main" id="{95099A30-0979-4D93-9518-1F0CAD491C82}"/>
+          <p:cNvPr id="2" name="Nadpis 1">
+            <a:extLst>
+              <a:ext uri="{FF2B5EF4-FFF2-40B4-BE49-F238E27FC236}">
+                <a16:creationId xmlns:a16="http://schemas.microsoft.com/office/drawing/2014/main" id="{7A4E1F93-BAAB-4833-A9FC-D061509D1884}"/>
               </a:ext>
             </a:extLst>
           </p:cNvPr>
@@ -5446,17 +5297,17 @@
           <a:p>
             <a:r>
               <a:rPr lang="cs-CZ" dirty="0"/>
-              <a:t>Základní části dokumentu XML, atributy III</a:t>
-            </a:r>
-          </a:p>
-        </p:txBody>
-      </p:sp>
-      <p:sp>
-        <p:nvSpPr>
-          <p:cNvPr id="10" name="Zástupný obsah 9">
-            <a:extLst>
-              <a:ext uri="{FF2B5EF4-FFF2-40B4-BE49-F238E27FC236}">
-                <a16:creationId xmlns:a16="http://schemas.microsoft.com/office/drawing/2014/main" id="{88A3F858-65CF-4E00-93E5-DA03EAAF744A}"/>
+              <a:t>Jak řešit (ne)překrývání elementů v XML TEI II</a:t>
+            </a:r>
+          </a:p>
+        </p:txBody>
+      </p:sp>
+      <p:sp>
+        <p:nvSpPr>
+          <p:cNvPr id="3" name="Zástupný obsah 2">
+            <a:extLst>
+              <a:ext uri="{FF2B5EF4-FFF2-40B4-BE49-F238E27FC236}">
+                <a16:creationId xmlns:a16="http://schemas.microsoft.com/office/drawing/2014/main" id="{34F2F3C4-1DF5-4CB6-92D4-F6FFFA382895}"/>
               </a:ext>
             </a:extLst>
           </p:cNvPr>
@@ -5472,168 +5323,210 @@
           <a:bodyPr/>
           <a:lstStyle/>
           <a:p>
-            <a:pPr lvl="0">
-              <a:buClr>
-                <a:srgbClr val="4472C4">
-                  <a:lumMod val="75000"/>
-                </a:srgbClr>
-              </a:buClr>
+            <a:r>
+              <a:rPr lang="cs-CZ" dirty="0"/>
+              <a:t>začátek a konec komentovaného textu</a:t>
+            </a:r>
+          </a:p>
+          <a:p>
+            <a:pPr lvl="1">
+              <a:buFont typeface="Wingdings" panose="05000000000000000000" pitchFamily="2" charset="2"/>
+              <a:buChar char="v"/>
             </a:pPr>
             <a:r>
-              <a:rPr lang="cs-CZ" dirty="0">
-                <a:solidFill>
-                  <a:prstClr val="black"/>
-                </a:solidFill>
-              </a:rPr>
-              <a:t>nezáleží na pořadí</a:t>
-            </a:r>
-          </a:p>
-          <a:p>
-            <a:pPr lvl="1">
-              <a:buClr>
-                <a:srgbClr val="4472C4">
-                  <a:lumMod val="75000"/>
-                </a:srgbClr>
-              </a:buClr>
-            </a:pPr>
-            <a:r>
-              <a:rPr lang="cs-CZ" dirty="0">
-                <a:solidFill>
-                  <a:prstClr val="black"/>
-                </a:solidFill>
-              </a:rPr>
-              <a:t>pořadí atributů v rámci značky může být libovolné</a:t>
-            </a:r>
-          </a:p>
-          <a:p>
-            <a:pPr lvl="2">
-              <a:buClr>
-                <a:srgbClr val="4472C4">
-                  <a:lumMod val="75000"/>
-                </a:srgbClr>
-              </a:buClr>
-            </a:pPr>
-            <a:r>
-              <a:rPr lang="cs-CZ" dirty="0">
-                <a:solidFill>
-                  <a:prstClr val="black"/>
-                </a:solidFill>
-              </a:rPr>
-              <a:t>někdy s pevně daným pořadím počítají programy pro zpracování XML, je však lepší řídit se názvem</a:t>
-            </a:r>
-          </a:p>
-          <a:p>
-            <a:pPr lvl="0">
-              <a:buClr>
-                <a:srgbClr val="4472C4">
-                  <a:lumMod val="75000"/>
-                </a:srgbClr>
-              </a:buClr>
-            </a:pPr>
-            <a:r>
-              <a:rPr lang="cs-CZ" dirty="0">
-                <a:solidFill>
-                  <a:prstClr val="black"/>
-                </a:solidFill>
-              </a:rPr>
-              <a:t>konvence</a:t>
-            </a:r>
-          </a:p>
-          <a:p>
-            <a:pPr lvl="1">
-              <a:buClr>
-                <a:srgbClr val="4472C4">
-                  <a:lumMod val="75000"/>
-                </a:srgbClr>
-              </a:buClr>
-            </a:pPr>
-            <a:r>
-              <a:rPr lang="cs-CZ" dirty="0">
-                <a:solidFill>
-                  <a:prstClr val="black"/>
-                </a:solidFill>
-              </a:rPr>
-              <a:t>v prezentaci názvy atributu s @ (@n)</a:t>
-            </a:r>
-          </a:p>
-          <a:p>
-            <a:pPr lvl="2">
-              <a:buClr>
-                <a:srgbClr val="4472C4">
-                  <a:lumMod val="75000"/>
-                </a:srgbClr>
-              </a:buClr>
-            </a:pPr>
-            <a:r>
-              <a:rPr lang="cs-CZ" dirty="0">
-                <a:solidFill>
-                  <a:prstClr val="black"/>
-                </a:solidFill>
-              </a:rPr>
-              <a:t>v XML se používá bez @ (&lt;div n="1"&gt;)</a:t>
-            </a:r>
-          </a:p>
-          <a:p>
-            <a:pPr lvl="2">
-              <a:buClr>
-                <a:srgbClr val="4472C4">
-                  <a:lumMod val="75000"/>
-                </a:srgbClr>
-              </a:buClr>
-            </a:pPr>
-            <a:r>
-              <a:rPr lang="cs-CZ" dirty="0">
-                <a:solidFill>
-                  <a:prstClr val="black"/>
-                </a:solidFill>
-              </a:rPr>
-              <a:t>s @ se používá v </a:t>
-            </a:r>
-            <a:r>
-              <a:rPr lang="cs-CZ" dirty="0" err="1">
-                <a:solidFill>
-                  <a:prstClr val="black"/>
-                </a:solidFill>
-              </a:rPr>
-              <a:t>XPath</a:t>
-            </a:r>
-            <a:r>
-              <a:rPr lang="cs-CZ" dirty="0">
-                <a:solidFill>
-                  <a:prstClr val="black"/>
-                </a:solidFill>
-              </a:rPr>
-              <a:t> ("p[@n]")</a:t>
-            </a:r>
-          </a:p>
-          <a:p>
-            <a:pPr lvl="1">
-              <a:buClr>
-                <a:srgbClr val="4472C4">
-                  <a:lumMod val="75000"/>
-                </a:srgbClr>
-              </a:buClr>
-            </a:pPr>
-            <a:r>
-              <a:rPr lang="cs-CZ" dirty="0">
-                <a:solidFill>
-                  <a:prstClr val="black"/>
-                </a:solidFill>
-              </a:rPr>
-              <a:t>pro rozlišení od názvu elementu (bez @)</a:t>
-            </a:r>
-          </a:p>
-          <a:p>
-            <a:endParaRPr lang="cs-CZ" dirty="0"/>
-          </a:p>
-        </p:txBody>
-      </p:sp>
-      <p:sp>
-        <p:nvSpPr>
-          <p:cNvPr id="7" name="Zástupný symbol pro datum 6">
-            <a:extLst>
-              <a:ext uri="{FF2B5EF4-FFF2-40B4-BE49-F238E27FC236}">
-                <a16:creationId xmlns:a16="http://schemas.microsoft.com/office/drawing/2014/main" id="{A328A056-3756-421E-8CF1-47D78ECC3B1C}"/>
+              <a:rPr lang="cs-CZ" dirty="0"/>
+              <a:t>&lt;p&gt;</a:t>
+            </a:r>
+            <a:br>
+              <a:rPr lang="cs-CZ" dirty="0"/>
+            </a:br>
+            <a:r>
+              <a:rPr lang="cs-CZ" dirty="0"/>
+              <a:t>  &lt;s&gt;Delší komentovaná </a:t>
+            </a:r>
+            <a:r>
+              <a:rPr lang="cs-CZ" b="1" dirty="0">
+                <a:solidFill>
+                  <a:srgbClr val="FF0000"/>
+                </a:solidFill>
+              </a:rPr>
+              <a:t>&lt;</a:t>
+            </a:r>
+            <a:r>
+              <a:rPr lang="cs-CZ" b="1" dirty="0" err="1">
+                <a:solidFill>
+                  <a:srgbClr val="FF0000"/>
+                </a:solidFill>
+              </a:rPr>
+              <a:t>anchor</a:t>
+            </a:r>
+            <a:r>
+              <a:rPr lang="cs-CZ" b="1" dirty="0">
+                <a:solidFill>
+                  <a:srgbClr val="FF0000"/>
+                </a:solidFill>
+              </a:rPr>
+              <a:t> </a:t>
+            </a:r>
+            <a:r>
+              <a:rPr lang="cs-CZ" b="1" dirty="0" err="1">
+                <a:solidFill>
+                  <a:srgbClr val="FF0000"/>
+                </a:solidFill>
+              </a:rPr>
+              <a:t>xml:id</a:t>
+            </a:r>
+            <a:r>
+              <a:rPr lang="cs-CZ" b="1" dirty="0">
+                <a:solidFill>
+                  <a:srgbClr val="FF0000"/>
+                </a:solidFill>
+              </a:rPr>
+              <a:t>="a-1" /&gt;</a:t>
+            </a:r>
+            <a:r>
+              <a:rPr lang="cs-CZ" dirty="0"/>
+              <a:t>pasáž se zvýrazněním &lt;</a:t>
+            </a:r>
+            <a:r>
+              <a:rPr lang="cs-CZ" dirty="0" err="1"/>
+              <a:t>hi</a:t>
+            </a:r>
+            <a:r>
+              <a:rPr lang="cs-CZ" dirty="0"/>
+              <a:t> style="</a:t>
+            </a:r>
+            <a:r>
+              <a:rPr lang="cs-CZ" dirty="0" err="1"/>
+              <a:t>italic</a:t>
+            </a:r>
+            <a:r>
+              <a:rPr lang="cs-CZ" dirty="0"/>
+              <a:t>"&gt;kurzívou&lt;/</a:t>
+            </a:r>
+            <a:r>
+              <a:rPr lang="cs-CZ" dirty="0" err="1"/>
+              <a:t>hi</a:t>
+            </a:r>
+            <a:r>
+              <a:rPr lang="cs-CZ" dirty="0"/>
+              <a:t>&gt;.</a:t>
+            </a:r>
+            <a:br>
+              <a:rPr lang="cs-CZ" dirty="0"/>
+            </a:br>
+            <a:r>
+              <a:rPr lang="cs-CZ" dirty="0"/>
+              <a:t>   &lt;/s&gt;</a:t>
+            </a:r>
+            <a:br>
+              <a:rPr lang="cs-CZ" dirty="0"/>
+            </a:br>
+            <a:r>
+              <a:rPr lang="cs-CZ" dirty="0"/>
+              <a:t>   &lt;</a:t>
+            </a:r>
+            <a:r>
+              <a:rPr lang="cs-CZ" dirty="0" err="1"/>
+              <a:t>app</a:t>
+            </a:r>
+            <a:r>
+              <a:rPr lang="cs-CZ" dirty="0"/>
+              <a:t> </a:t>
+            </a:r>
+            <a:r>
+              <a:rPr lang="cs-CZ" b="1" dirty="0" err="1">
+                <a:solidFill>
+                  <a:srgbClr val="FF0000"/>
+                </a:solidFill>
+              </a:rPr>
+              <a:t>from</a:t>
+            </a:r>
+            <a:r>
+              <a:rPr lang="cs-CZ" b="1" dirty="0">
+                <a:solidFill>
+                  <a:srgbClr val="FF0000"/>
+                </a:solidFill>
+              </a:rPr>
+              <a:t>="#a-1"</a:t>
+            </a:r>
+            <a:r>
+              <a:rPr lang="cs-CZ" dirty="0"/>
+              <a:t>&gt;</a:t>
+            </a:r>
+            <a:br>
+              <a:rPr lang="cs-CZ" dirty="0"/>
+            </a:br>
+            <a:r>
+              <a:rPr lang="cs-CZ" dirty="0"/>
+              <a:t>      &lt;</a:t>
+            </a:r>
+            <a:r>
+              <a:rPr lang="cs-CZ" dirty="0" err="1"/>
+              <a:t>note</a:t>
+            </a:r>
+            <a:r>
+              <a:rPr lang="cs-CZ" dirty="0"/>
+              <a:t>&gt;Text komentáře, který se týká úseku "pasáž se zvýrazněním kurzívou."&lt;/</a:t>
+            </a:r>
+            <a:r>
+              <a:rPr lang="cs-CZ" dirty="0" err="1"/>
+              <a:t>note</a:t>
+            </a:r>
+            <a:r>
+              <a:rPr lang="cs-CZ" dirty="0"/>
+              <a:t>&gt;</a:t>
+            </a:r>
+            <a:br>
+              <a:rPr lang="cs-CZ" dirty="0"/>
+            </a:br>
+            <a:r>
+              <a:rPr lang="cs-CZ" dirty="0"/>
+              <a:t>     &lt;/</a:t>
+            </a:r>
+            <a:r>
+              <a:rPr lang="cs-CZ" dirty="0" err="1"/>
+              <a:t>app</a:t>
+            </a:r>
+            <a:r>
+              <a:rPr lang="cs-CZ" dirty="0"/>
+              <a:t>&gt;</a:t>
+            </a:r>
+            <a:br>
+              <a:rPr lang="cs-CZ" dirty="0"/>
+            </a:br>
+            <a:r>
+              <a:rPr lang="cs-CZ" dirty="0"/>
+              <a:t> A odstavec končí.</a:t>
+            </a:r>
+            <a:br>
+              <a:rPr lang="cs-CZ" dirty="0"/>
+            </a:br>
+            <a:r>
+              <a:rPr lang="cs-CZ" dirty="0"/>
+              <a:t>&lt;/p&gt;</a:t>
+            </a:r>
+          </a:p>
+          <a:p>
+            <a:pPr lvl="2"/>
+            <a:r>
+              <a:rPr lang="cs-CZ" dirty="0"/>
+              <a:t>na začátku pasáže prázdný element s identifikátorem + odkaz na začátek pasáže v atributu @</a:t>
+            </a:r>
+            <a:r>
+              <a:rPr lang="cs-CZ" dirty="0" err="1"/>
+              <a:t>from</a:t>
+            </a:r>
+            <a:endParaRPr lang="cs-CZ" dirty="0"/>
+          </a:p>
+        </p:txBody>
+      </p:sp>
+      <p:sp>
+        <p:nvSpPr>
+          <p:cNvPr id="4" name="Zástupný symbol pro datum 3">
+            <a:extLst>
+              <a:ext uri="{FF2B5EF4-FFF2-40B4-BE49-F238E27FC236}">
+                <a16:creationId xmlns:a16="http://schemas.microsoft.com/office/drawing/2014/main" id="{577A4DDE-D2AE-447B-8214-34FD7492759B}"/>
               </a:ext>
             </a:extLst>
           </p:cNvPr>
@@ -5659,10 +5552,10 @@
       </p:sp>
       <p:sp>
         <p:nvSpPr>
-          <p:cNvPr id="8" name="Zástupný symbol pro číslo snímku 7">
-            <a:extLst>
-              <a:ext uri="{FF2B5EF4-FFF2-40B4-BE49-F238E27FC236}">
-                <a16:creationId xmlns:a16="http://schemas.microsoft.com/office/drawing/2014/main" id="{913983A7-E3FD-4D44-BB86-E2D7932C32AB}"/>
+          <p:cNvPr id="5" name="Zástupný symbol pro číslo snímku 4">
+            <a:extLst>
+              <a:ext uri="{FF2B5EF4-FFF2-40B4-BE49-F238E27FC236}">
+                <a16:creationId xmlns:a16="http://schemas.microsoft.com/office/drawing/2014/main" id="{4CF299EE-D0B1-4092-83BF-7E17100F2D2F}"/>
               </a:ext>
             </a:extLst>
           </p:cNvPr>
@@ -5688,10 +5581,10 @@
       </p:sp>
       <p:sp>
         <p:nvSpPr>
-          <p:cNvPr id="2" name="Zástupný symbol pro zápatí 1">
-            <a:extLst>
-              <a:ext uri="{FF2B5EF4-FFF2-40B4-BE49-F238E27FC236}">
-                <a16:creationId xmlns:a16="http://schemas.microsoft.com/office/drawing/2014/main" id="{435AC780-DE3B-4791-AEA1-37FE5358FE3C}"/>
+          <p:cNvPr id="6" name="Zástupný symbol pro zápatí 5">
+            <a:extLst>
+              <a:ext uri="{FF2B5EF4-FFF2-40B4-BE49-F238E27FC236}">
+                <a16:creationId xmlns:a16="http://schemas.microsoft.com/office/drawing/2014/main" id="{8070006A-7C91-494B-A1C1-AF3653BEAF6D}"/>
               </a:ext>
             </a:extLst>
           </p:cNvPr>
@@ -5718,7 +5611,7 @@
     </p:spTree>
     <p:extLst>
       <p:ext uri="{BB962C8B-B14F-4D97-AF65-F5344CB8AC3E}">
-        <p14:creationId xmlns:p14="http://schemas.microsoft.com/office/powerpoint/2010/main" val="302397376"/>
+        <p14:creationId xmlns:p14="http://schemas.microsoft.com/office/powerpoint/2010/main" val="2039023402"/>
       </p:ext>
     </p:extLst>
   </p:cSld>
@@ -12184,8 +12077,12 @@
               <a:t>číslo.dílu</a:t>
             </a:r>
             <a:r>
-              <a:rPr lang="cs-CZ" dirty="0"/>
-              <a:t> typ-číslo="arabské"&gt;</a:t>
+              <a:rPr lang="cs-CZ"/>
+              <a:t> typ-čísla="</a:t>
+            </a:r>
+            <a:r>
+              <a:rPr lang="cs-CZ" dirty="0"/>
+              <a:t>arabské"&gt;</a:t>
             </a:r>
           </a:p>
           <a:p>
@@ -13557,7 +13454,7 @@
             <a:pPr lvl="1"/>
             <a:r>
               <a:rPr lang="cs-CZ" dirty="0"/>
-              <a:t>složené závorky</a:t>
+              <a:t>špičaté závorky</a:t>
             </a:r>
           </a:p>
           <a:p>
@@ -14211,7 +14108,7 @@
             <a:pPr lvl="1"/>
             <a:r>
               <a:rPr lang="cs-CZ" dirty="0"/>
-              <a:t>koncová značka	/tag	</a:t>
+              <a:t>koncová značka/tag	</a:t>
             </a:r>
             <a:r>
               <a:rPr lang="cs-CZ" b="1" dirty="0"/>
@@ -15556,7 +15453,7 @@
           <p:cNvPr id="2" name="Nadpis 1">
             <a:extLst>
               <a:ext uri="{FF2B5EF4-FFF2-40B4-BE49-F238E27FC236}">
-                <a16:creationId xmlns:a16="http://schemas.microsoft.com/office/drawing/2014/main" id="{88C0DF56-9D1A-40D5-A414-F8466539FDDA}"/>
+                <a16:creationId xmlns:a16="http://schemas.microsoft.com/office/drawing/2014/main" id="{AA2FD737-6EF6-4588-8139-9D80FBB00749}"/>
               </a:ext>
             </a:extLst>
           </p:cNvPr>
@@ -15574,237 +15471,348 @@
           <a:p>
             <a:r>
               <a:rPr lang="cs-CZ" dirty="0"/>
-              <a:t>Jak řešit (ne)překrývání elementů v XML TEI</a:t>
-            </a:r>
-          </a:p>
-        </p:txBody>
-      </p:sp>
-      <p:sp>
-        <p:nvSpPr>
-          <p:cNvPr id="7" name="Zástupný obsah 6">
-            <a:extLst>
-              <a:ext uri="{FF2B5EF4-FFF2-40B4-BE49-F238E27FC236}">
-                <a16:creationId xmlns:a16="http://schemas.microsoft.com/office/drawing/2014/main" id="{D7E19EBE-0E3E-4325-AFE1-235A5E15B272}"/>
-              </a:ext>
-            </a:extLst>
-          </p:cNvPr>
-          <p:cNvSpPr>
-            <a:spLocks noGrp="1"/>
-          </p:cNvSpPr>
-          <p:nvPr>
-            <p:ph idx="1"/>
-          </p:nvPr>
-        </p:nvSpPr>
-        <p:spPr/>
+              <a:t>Základní části dokumentu XML, atributy</a:t>
+            </a:r>
+          </a:p>
+        </p:txBody>
+      </p:sp>
+      <p:sp>
+        <p:nvSpPr>
+          <p:cNvPr id="3" name="Zástupný text 2">
+            <a:extLst>
+              <a:ext uri="{FF2B5EF4-FFF2-40B4-BE49-F238E27FC236}">
+                <a16:creationId xmlns:a16="http://schemas.microsoft.com/office/drawing/2014/main" id="{EAE0A3D3-6250-4BED-8697-E2A10239BA10}"/>
+              </a:ext>
+            </a:extLst>
+          </p:cNvPr>
+          <p:cNvSpPr>
+            <a:spLocks noGrp="1"/>
+          </p:cNvSpPr>
+          <p:nvPr>
+            <p:ph type="body" idx="1"/>
+          </p:nvPr>
+        </p:nvSpPr>
+        <p:spPr/>
+        <p:txBody>
+          <a:bodyPr/>
+          <a:lstStyle/>
+          <a:p>
+            <a:r>
+              <a:rPr lang="cs-CZ" dirty="0"/>
+              <a:t>atribut</a:t>
+            </a:r>
+          </a:p>
+        </p:txBody>
+      </p:sp>
+      <p:sp>
+        <p:nvSpPr>
+          <p:cNvPr id="4" name="Zástupný obsah 3">
+            <a:extLst>
+              <a:ext uri="{FF2B5EF4-FFF2-40B4-BE49-F238E27FC236}">
+                <a16:creationId xmlns:a16="http://schemas.microsoft.com/office/drawing/2014/main" id="{9A80166F-C925-4EAA-8A47-E3DF57FABDD4}"/>
+              </a:ext>
+            </a:extLst>
+          </p:cNvPr>
+          <p:cNvSpPr>
+            <a:spLocks noGrp="1"/>
+          </p:cNvSpPr>
+          <p:nvPr>
+            <p:ph sz="half" idx="2"/>
+          </p:nvPr>
+        </p:nvSpPr>
+        <p:spPr>
+          <a:xfrm>
+            <a:off x="360000" y="2505074"/>
+            <a:ext cx="5637575" cy="3789399"/>
+          </a:xfrm>
+        </p:spPr>
         <p:txBody>
           <a:bodyPr>
-            <a:normAutofit/>
+            <a:normAutofit fontScale="92500"/>
           </a:bodyPr>
           <a:lstStyle/>
           <a:p>
             <a:r>
               <a:rPr lang="cs-CZ" dirty="0"/>
-              <a:t>hranice strany nebo sloupce (podobně biblické knihy, kapitoly a verše)</a:t>
-            </a:r>
-          </a:p>
-          <a:p>
-            <a:pPr lvl="1">
+              <a:t>doplňuje k elementu další informace</a:t>
+            </a:r>
+          </a:p>
+          <a:p>
+            <a:r>
+              <a:rPr lang="cs-CZ" dirty="0"/>
+              <a:t>tvoří ho</a:t>
+            </a:r>
+          </a:p>
+          <a:p>
+            <a:pPr lvl="1"/>
+            <a:r>
+              <a:rPr lang="cs-CZ" dirty="0"/>
+              <a:t>název atributu</a:t>
+            </a:r>
+          </a:p>
+          <a:p>
+            <a:pPr lvl="1"/>
+            <a:r>
+              <a:rPr lang="cs-CZ" dirty="0"/>
+              <a:t>=</a:t>
+            </a:r>
+          </a:p>
+          <a:p>
+            <a:pPr lvl="1"/>
+            <a:r>
+              <a:rPr lang="cs-CZ" dirty="0"/>
+              <a:t>hodnota (v uvozovkách: " nebo ')</a:t>
+            </a:r>
+          </a:p>
+          <a:p>
+            <a:pPr lvl="2"/>
+            <a:r>
+              <a:rPr lang="cs-CZ" dirty="0"/>
+              <a:t>" a ' se hodí při dotazování: </a:t>
+            </a:r>
+            <a:r>
+              <a:rPr lang="cs-CZ" dirty="0" err="1"/>
+              <a:t>XPath</a:t>
+            </a:r>
+            <a:endParaRPr lang="cs-CZ" dirty="0"/>
+          </a:p>
+          <a:p>
+            <a:r>
+              <a:rPr lang="cs-CZ" dirty="0"/>
+              <a:t>je součástí </a:t>
+            </a:r>
+            <a:r>
+              <a:rPr lang="cs-CZ" b="1" dirty="0"/>
+              <a:t>počáteční</a:t>
+            </a:r>
+            <a:r>
+              <a:rPr lang="cs-CZ" dirty="0"/>
+              <a:t> značky elementu</a:t>
+            </a:r>
+          </a:p>
+          <a:p>
+            <a:r>
+              <a:rPr lang="cs-CZ" dirty="0"/>
+              <a:t>více atributů se odděluje mezerou</a:t>
+            </a:r>
+          </a:p>
+          <a:p>
+            <a:endParaRPr lang="cs-CZ" dirty="0"/>
+          </a:p>
+        </p:txBody>
+      </p:sp>
+      <p:sp>
+        <p:nvSpPr>
+          <p:cNvPr id="5" name="Zástupný text 4">
+            <a:extLst>
+              <a:ext uri="{FF2B5EF4-FFF2-40B4-BE49-F238E27FC236}">
+                <a16:creationId xmlns:a16="http://schemas.microsoft.com/office/drawing/2014/main" id="{D8020493-0E1F-4321-B419-AFA9675C64A2}"/>
+              </a:ext>
+            </a:extLst>
+          </p:cNvPr>
+          <p:cNvSpPr>
+            <a:spLocks noGrp="1"/>
+          </p:cNvSpPr>
+          <p:nvPr>
+            <p:ph type="body" sz="quarter" idx="3"/>
+          </p:nvPr>
+        </p:nvSpPr>
+        <p:spPr/>
+        <p:txBody>
+          <a:bodyPr/>
+          <a:lstStyle/>
+          <a:p>
+            <a:r>
+              <a:rPr lang="cs-CZ" dirty="0"/>
+              <a:t>příklady</a:t>
+            </a:r>
+          </a:p>
+        </p:txBody>
+      </p:sp>
+      <p:sp>
+        <p:nvSpPr>
+          <p:cNvPr id="6" name="Zástupný obsah 5">
+            <a:extLst>
+              <a:ext uri="{FF2B5EF4-FFF2-40B4-BE49-F238E27FC236}">
+                <a16:creationId xmlns:a16="http://schemas.microsoft.com/office/drawing/2014/main" id="{A91A591C-FFF8-4B18-964E-898DFB42E536}"/>
+              </a:ext>
+            </a:extLst>
+          </p:cNvPr>
+          <p:cNvSpPr>
+            <a:spLocks noGrp="1"/>
+          </p:cNvSpPr>
+          <p:nvPr>
+            <p:ph sz="quarter" idx="4"/>
+          </p:nvPr>
+        </p:nvSpPr>
+        <p:spPr>
+          <a:xfrm>
+            <a:off x="6096000" y="2505075"/>
+            <a:ext cx="5755200" cy="3789398"/>
+          </a:xfrm>
+        </p:spPr>
+        <p:txBody>
+          <a:bodyPr>
+            <a:noAutofit/>
+          </a:bodyPr>
+          <a:lstStyle/>
+          <a:p>
+            <a:pPr>
               <a:buFont typeface="Wingdings" panose="05000000000000000000" pitchFamily="2" charset="2"/>
               <a:buChar char="v"/>
             </a:pPr>
             <a:r>
-              <a:rPr lang="cs-CZ" dirty="0"/>
-              <a:t>&lt;p&gt;Text odstavce &lt;</a:t>
-            </a:r>
-            <a:r>
-              <a:rPr lang="cs-CZ" dirty="0" err="1"/>
-              <a:t>pb</a:t>
-            </a:r>
-            <a:r>
-              <a:rPr lang="cs-CZ" dirty="0"/>
-              <a:t> n="</a:t>
-            </a:r>
-            <a:r>
-              <a:rPr lang="cs-CZ" dirty="0" err="1"/>
-              <a:t>23r</a:t>
-            </a:r>
-            <a:r>
-              <a:rPr lang="cs-CZ" dirty="0"/>
-              <a:t>"/&gt;pokračující na další stránce.&lt;/p&gt;</a:t>
-            </a:r>
-          </a:p>
-          <a:p>
-            <a:pPr lvl="2">
+              <a:rPr lang="cs-CZ" sz="2000" dirty="0"/>
+              <a:t>&lt;titul typ="hlavní"&gt;Český snář&lt;/titul&gt;</a:t>
+            </a:r>
+          </a:p>
+          <a:p>
+            <a:pPr>
+              <a:buFont typeface="Wingdings" panose="05000000000000000000" pitchFamily="2" charset="2"/>
+              <a:buChar char="v"/>
+            </a:pPr>
+            <a:endParaRPr lang="cs-CZ" sz="2000" dirty="0"/>
+          </a:p>
+          <a:p>
+            <a:pPr>
+              <a:buFont typeface="Wingdings" panose="05000000000000000000" pitchFamily="2" charset="2"/>
+              <a:buChar char="v"/>
+            </a:pPr>
+            <a:r>
+              <a:rPr lang="cs-CZ" sz="2000" dirty="0"/>
+              <a:t>&lt;titul typ="vysokoškolský"&gt;Mgr.&lt;/titul&gt;</a:t>
+            </a:r>
+          </a:p>
+          <a:p>
+            <a:pPr>
+              <a:buFont typeface="Wingdings" panose="05000000000000000000" pitchFamily="2" charset="2"/>
+              <a:buChar char="v"/>
+            </a:pPr>
+            <a:r>
+              <a:rPr lang="cs-CZ" sz="2000" dirty="0"/>
+              <a:t>&lt;titul typ='vysokoškolský'&gt;Mgr.&lt;/titul&gt;</a:t>
+            </a:r>
+          </a:p>
+          <a:p>
+            <a:pPr lvl="0">
               <a:buClr>
                 <a:srgbClr val="4472C4">
                   <a:lumMod val="75000"/>
                 </a:srgbClr>
               </a:buClr>
             </a:pPr>
-            <a:r>
-              <a:rPr lang="cs-CZ" dirty="0">
-                <a:solidFill>
-                  <a:prstClr val="black"/>
-                </a:solidFill>
-              </a:rPr>
-              <a:t>použití prázdného elementu/prvku</a:t>
-            </a:r>
-          </a:p>
-          <a:p>
-            <a:r>
-              <a:rPr lang="cs-CZ" dirty="0"/>
-              <a:t>přímá řeč přes více odstavců</a:t>
-            </a:r>
-          </a:p>
-          <a:p>
-            <a:pPr lvl="1">
+            <a:endParaRPr lang="cs-CZ" dirty="0">
+              <a:solidFill>
+                <a:prstClr val="black"/>
+              </a:solidFill>
+            </a:endParaRPr>
+          </a:p>
+          <a:p>
+            <a:pPr>
               <a:buFont typeface="Wingdings" panose="05000000000000000000" pitchFamily="2" charset="2"/>
               <a:buChar char="v"/>
             </a:pPr>
             <a:r>
-              <a:rPr lang="cs-CZ" dirty="0"/>
-              <a:t>&lt;p&gt;„Text přímé řeči… konec odstavce.&lt;/p&gt;&lt;p&gt;Přímá řeč pokračuje…“&lt;/p&gt;</a:t>
-            </a:r>
-          </a:p>
-          <a:p>
-            <a:pPr lvl="2"/>
-            <a:r>
-              <a:rPr lang="cs-CZ" dirty="0"/>
-              <a:t>bez označení prvku pro přímou řeč</a:t>
-            </a:r>
-          </a:p>
-          <a:p>
-            <a:pPr lvl="1">
-              <a:buFont typeface="Wingdings" panose="05000000000000000000" pitchFamily="2" charset="2"/>
-              <a:buChar char="v"/>
-            </a:pPr>
-            <a:r>
-              <a:rPr lang="cs-CZ" dirty="0">
+              <a:rPr lang="cs-CZ" sz="2000" dirty="0">
                 <a:solidFill>
                   <a:srgbClr val="7030A0"/>
                 </a:solidFill>
               </a:rPr>
-              <a:t>&lt;p&gt;&lt;q&gt;„Text přímé řeči… konec odstavce.&lt;/p&gt;</a:t>
-            </a:r>
-            <a:br>
-              <a:rPr lang="cs-CZ" dirty="0">
+              <a:t>&lt;titul&gt;Český snář&lt;/titul typ="hlavní"&gt; </a:t>
+            </a:r>
+            <a:r>
+              <a:rPr lang="cs-CZ" sz="2000" dirty="0">
                 <a:solidFill>
                   <a:srgbClr val="7030A0"/>
                 </a:solidFill>
-              </a:rPr>
-            </a:br>
-            <a:r>
-              <a:rPr lang="cs-CZ" dirty="0">
-                <a:solidFill>
-                  <a:srgbClr val="7030A0"/>
-                </a:solidFill>
-              </a:rPr>
-              <a:t>&lt;p&gt;Přímá řeč pokračuje…“&lt;/q&gt;&lt;/p&gt; </a:t>
-            </a:r>
-            <a:r>
-              <a:rPr lang="cs-CZ" dirty="0">
-                <a:solidFill>
-                  <a:srgbClr val="7030A0"/>
-                </a:solidFill>
                 <a:sym typeface="Wingdings" panose="05000000000000000000" pitchFamily="2" charset="2"/>
               </a:rPr>
-              <a:t> </a:t>
-            </a:r>
-          </a:p>
-          <a:p>
-            <a:pPr lvl="1">
-              <a:buFont typeface="Wingdings" panose="05000000000000000000" pitchFamily="2" charset="2"/>
-              <a:buChar char="v"/>
-            </a:pPr>
-            <a:r>
-              <a:rPr lang="cs-CZ" dirty="0"/>
-              <a:t>&lt;p&gt;&lt;q </a:t>
-            </a:r>
-            <a:r>
-              <a:rPr lang="cs-CZ" dirty="0" err="1"/>
-              <a:t>xml:id</a:t>
-            </a:r>
-            <a:r>
-              <a:rPr lang="cs-CZ" dirty="0"/>
-              <a:t>="q-1" </a:t>
-            </a:r>
-            <a:r>
-              <a:rPr lang="cs-CZ" dirty="0" err="1"/>
-              <a:t>next</a:t>
-            </a:r>
-            <a:r>
-              <a:rPr lang="cs-CZ" dirty="0"/>
-              <a:t>="#q-2"&gt;„Text přímé řeči… konec odstavce.&lt;/q&gt;&lt;/p&gt;</a:t>
-            </a:r>
-            <a:br>
-              <a:rPr lang="cs-CZ" dirty="0"/>
-            </a:br>
-            <a:r>
-              <a:rPr lang="cs-CZ" dirty="0"/>
-              <a:t>&lt;p&gt;&lt;q </a:t>
-            </a:r>
-            <a:r>
-              <a:rPr lang="cs-CZ" dirty="0" err="1"/>
-              <a:t>xml:id</a:t>
-            </a:r>
-            <a:r>
-              <a:rPr lang="cs-CZ" dirty="0"/>
-              <a:t>="q-2" </a:t>
-            </a:r>
-            <a:r>
-              <a:rPr lang="cs-CZ" dirty="0" err="1"/>
-              <a:t>prev</a:t>
-            </a:r>
-            <a:r>
-              <a:rPr lang="cs-CZ" dirty="0"/>
-              <a:t>="#q-1"&gt;Přímá řeč pokračuje…“&lt;/q&gt;&lt;/p&gt; </a:t>
-            </a:r>
-            <a:r>
-              <a:rPr lang="cs-CZ" dirty="0">
-                <a:sym typeface="Wingdings" panose="05000000000000000000" pitchFamily="2" charset="2"/>
-              </a:rPr>
-              <a:t></a:t>
-            </a:r>
-          </a:p>
-          <a:p>
-            <a:pPr lvl="2">
+              <a:t></a:t>
+            </a:r>
+            <a:endParaRPr lang="cs-CZ" sz="2000" dirty="0">
+              <a:solidFill>
+                <a:srgbClr val="7030A0"/>
+              </a:solidFill>
+            </a:endParaRPr>
+          </a:p>
+          <a:p>
+            <a:pPr lvl="0">
               <a:buClr>
                 <a:srgbClr val="4472C4">
                   <a:lumMod val="75000"/>
                 </a:srgbClr>
               </a:buClr>
-            </a:pPr>
-            <a:r>
-              <a:rPr lang="cs-CZ" dirty="0">
-                <a:solidFill>
-                  <a:prstClr val="black"/>
-                </a:solidFill>
-              </a:rPr>
-              <a:t>použití dvou prvků pro přímou řeč (&lt;q&gt;), návaznost se řeší pomocí odkazování mezi prvky</a:t>
-            </a:r>
-          </a:p>
-          <a:p>
-            <a:pPr lvl="1">
               <a:buFont typeface="Wingdings" panose="05000000000000000000" pitchFamily="2" charset="2"/>
               <a:buChar char="v"/>
             </a:pPr>
-            <a:endParaRPr lang="cs-CZ" dirty="0"/>
-          </a:p>
-          <a:p>
-            <a:pPr lvl="1">
+            <a:endParaRPr lang="cs-CZ" sz="2100" dirty="0">
+              <a:solidFill>
+                <a:prstClr val="black"/>
+              </a:solidFill>
+            </a:endParaRPr>
+          </a:p>
+          <a:p>
+            <a:pPr lvl="0">
+              <a:buClr>
+                <a:srgbClr val="4472C4">
+                  <a:lumMod val="75000"/>
+                </a:srgbClr>
+              </a:buClr>
               <a:buFont typeface="Wingdings" panose="05000000000000000000" pitchFamily="2" charset="2"/>
               <a:buChar char="v"/>
             </a:pPr>
-            <a:endParaRPr lang="cs-CZ" dirty="0"/>
-          </a:p>
-        </p:txBody>
-      </p:sp>
-      <p:sp>
-        <p:nvSpPr>
-          <p:cNvPr id="5" name="Zástupný symbol pro datum 4">
-            <a:extLst>
-              <a:ext uri="{FF2B5EF4-FFF2-40B4-BE49-F238E27FC236}">
-                <a16:creationId xmlns:a16="http://schemas.microsoft.com/office/drawing/2014/main" id="{1A74DB83-3FEF-4AD4-8396-17C1971463E9}"/>
+            <a:r>
+              <a:rPr lang="cs-CZ" sz="2100" dirty="0">
+                <a:solidFill>
+                  <a:prstClr val="black"/>
+                </a:solidFill>
+              </a:rPr>
+              <a:t>&lt;div n="1" type="</a:t>
+            </a:r>
+            <a:r>
+              <a:rPr lang="cs-CZ" sz="2100" dirty="0" err="1">
+                <a:solidFill>
+                  <a:prstClr val="black"/>
+                </a:solidFill>
+              </a:rPr>
+              <a:t>foreword</a:t>
+            </a:r>
+            <a:r>
+              <a:rPr lang="cs-CZ" sz="2100" dirty="0">
+                <a:solidFill>
+                  <a:prstClr val="black"/>
+                </a:solidFill>
+              </a:rPr>
+              <a:t>"&gt;…&lt;/div&gt;</a:t>
+            </a:r>
+            <a:endParaRPr lang="cs-CZ" dirty="0">
+              <a:solidFill>
+                <a:prstClr val="black"/>
+              </a:solidFill>
+            </a:endParaRPr>
+          </a:p>
+          <a:p>
+            <a:pPr>
+              <a:buFont typeface="Wingdings" panose="05000000000000000000" pitchFamily="2" charset="2"/>
+              <a:buChar char="v"/>
+            </a:pPr>
+            <a:endParaRPr lang="cs-CZ" sz="2400" dirty="0"/>
+          </a:p>
+          <a:p>
+            <a:pPr>
+              <a:buFont typeface="Wingdings" panose="05000000000000000000" pitchFamily="2" charset="2"/>
+              <a:buChar char="v"/>
+            </a:pPr>
+            <a:endParaRPr lang="cs-CZ" dirty="0"/>
+          </a:p>
+        </p:txBody>
+      </p:sp>
+      <p:sp>
+        <p:nvSpPr>
+          <p:cNvPr id="7" name="Zástupný symbol pro datum 6">
+            <a:extLst>
+              <a:ext uri="{FF2B5EF4-FFF2-40B4-BE49-F238E27FC236}">
+                <a16:creationId xmlns:a16="http://schemas.microsoft.com/office/drawing/2014/main" id="{18E08B85-4550-4032-A594-4FB46CDE033C}"/>
               </a:ext>
             </a:extLst>
           </p:cNvPr>
@@ -15830,10 +15838,10 @@
       </p:sp>
       <p:sp>
         <p:nvSpPr>
-          <p:cNvPr id="6" name="Zástupný symbol pro číslo snímku 5">
-            <a:extLst>
-              <a:ext uri="{FF2B5EF4-FFF2-40B4-BE49-F238E27FC236}">
-                <a16:creationId xmlns:a16="http://schemas.microsoft.com/office/drawing/2014/main" id="{E0D51FB8-709A-4C26-8BE3-DBD4EC0CF0AA}"/>
+          <p:cNvPr id="8" name="Zástupný symbol pro číslo snímku 7">
+            <a:extLst>
+              <a:ext uri="{FF2B5EF4-FFF2-40B4-BE49-F238E27FC236}">
+                <a16:creationId xmlns:a16="http://schemas.microsoft.com/office/drawing/2014/main" id="{4E2C9467-A938-42DE-901E-A889A05A0C32}"/>
               </a:ext>
             </a:extLst>
           </p:cNvPr>
@@ -15859,10 +15867,10 @@
       </p:sp>
       <p:sp>
         <p:nvSpPr>
-          <p:cNvPr id="3" name="Zástupný symbol pro zápatí 2">
-            <a:extLst>
-              <a:ext uri="{FF2B5EF4-FFF2-40B4-BE49-F238E27FC236}">
-                <a16:creationId xmlns:a16="http://schemas.microsoft.com/office/drawing/2014/main" id="{EF1886E8-1C30-4EC3-BD3C-BD23AE4AF3D9}"/>
+          <p:cNvPr id="9" name="Zástupný symbol pro zápatí 8">
+            <a:extLst>
+              <a:ext uri="{FF2B5EF4-FFF2-40B4-BE49-F238E27FC236}">
+                <a16:creationId xmlns:a16="http://schemas.microsoft.com/office/drawing/2014/main" id="{B3BF42B1-0984-4D32-91BA-AEA9FDF4020C}"/>
               </a:ext>
             </a:extLst>
           </p:cNvPr>
@@ -15889,7 +15897,7 @@
     </p:spTree>
     <p:extLst>
       <p:ext uri="{BB962C8B-B14F-4D97-AF65-F5344CB8AC3E}">
-        <p14:creationId xmlns:p14="http://schemas.microsoft.com/office/powerpoint/2010/main" val="996861646"/>
+        <p14:creationId xmlns:p14="http://schemas.microsoft.com/office/powerpoint/2010/main" val="1067496593"/>
       </p:ext>
     </p:extLst>
   </p:cSld>
@@ -15921,7 +15929,7 @@
           <p:cNvPr id="2" name="Nadpis 1">
             <a:extLst>
               <a:ext uri="{FF2B5EF4-FFF2-40B4-BE49-F238E27FC236}">
-                <a16:creationId xmlns:a16="http://schemas.microsoft.com/office/drawing/2014/main" id="{7A4E1F93-BAAB-4833-A9FC-D061509D1884}"/>
+                <a16:creationId xmlns:a16="http://schemas.microsoft.com/office/drawing/2014/main" id="{AA2FD737-6EF6-4588-8139-9D80FBB00749}"/>
               </a:ext>
             </a:extLst>
           </p:cNvPr>
@@ -15939,25 +15947,25 @@
           <a:p>
             <a:r>
               <a:rPr lang="cs-CZ" dirty="0"/>
-              <a:t>Jak řešit (ne)překrývání elementů v XML TEI II</a:t>
-            </a:r>
-          </a:p>
-        </p:txBody>
-      </p:sp>
-      <p:sp>
-        <p:nvSpPr>
-          <p:cNvPr id="3" name="Zástupný obsah 2">
-            <a:extLst>
-              <a:ext uri="{FF2B5EF4-FFF2-40B4-BE49-F238E27FC236}">
-                <a16:creationId xmlns:a16="http://schemas.microsoft.com/office/drawing/2014/main" id="{34F2F3C4-1DF5-4CB6-92D4-F6FFFA382895}"/>
-              </a:ext>
-            </a:extLst>
-          </p:cNvPr>
-          <p:cNvSpPr>
-            <a:spLocks noGrp="1"/>
-          </p:cNvSpPr>
-          <p:nvPr>
-            <p:ph idx="1"/>
+              <a:t>Základní části dokumentu XML, atributy II</a:t>
+            </a:r>
+          </a:p>
+        </p:txBody>
+      </p:sp>
+      <p:sp>
+        <p:nvSpPr>
+          <p:cNvPr id="3" name="Zástupný text 2">
+            <a:extLst>
+              <a:ext uri="{FF2B5EF4-FFF2-40B4-BE49-F238E27FC236}">
+                <a16:creationId xmlns:a16="http://schemas.microsoft.com/office/drawing/2014/main" id="{EAE0A3D3-6250-4BED-8697-E2A10239BA10}"/>
+              </a:ext>
+            </a:extLst>
+          </p:cNvPr>
+          <p:cNvSpPr>
+            <a:spLocks noGrp="1"/>
+          </p:cNvSpPr>
+          <p:nvPr>
+            <p:ph type="body" idx="1"/>
           </p:nvPr>
         </p:nvSpPr>
         <p:spPr/>
@@ -15967,208 +15975,358 @@
           <a:p>
             <a:r>
               <a:rPr lang="cs-CZ" dirty="0"/>
-              <a:t>začátek a konec komentovaného textu</a:t>
-            </a:r>
-          </a:p>
-          <a:p>
-            <a:pPr lvl="1">
+              <a:t>atribut</a:t>
+            </a:r>
+          </a:p>
+        </p:txBody>
+      </p:sp>
+      <p:sp>
+        <p:nvSpPr>
+          <p:cNvPr id="4" name="Zástupný obsah 3">
+            <a:extLst>
+              <a:ext uri="{FF2B5EF4-FFF2-40B4-BE49-F238E27FC236}">
+                <a16:creationId xmlns:a16="http://schemas.microsoft.com/office/drawing/2014/main" id="{9A80166F-C925-4EAA-8A47-E3DF57FABDD4}"/>
+              </a:ext>
+            </a:extLst>
+          </p:cNvPr>
+          <p:cNvSpPr>
+            <a:spLocks noGrp="1"/>
+          </p:cNvSpPr>
+          <p:nvPr>
+            <p:ph sz="half" idx="2"/>
+          </p:nvPr>
+        </p:nvSpPr>
+        <p:spPr>
+          <a:xfrm>
+            <a:off x="360000" y="2505074"/>
+            <a:ext cx="5637575" cy="3789399"/>
+          </a:xfrm>
+        </p:spPr>
+        <p:txBody>
+          <a:bodyPr>
+            <a:normAutofit/>
+          </a:bodyPr>
+          <a:lstStyle/>
+          <a:p>
+            <a:r>
+              <a:rPr lang="cs-CZ" dirty="0"/>
+              <a:t>v rámci 1 elementu nelze mít více atributů se stejným názvem</a:t>
+            </a:r>
+          </a:p>
+          <a:p>
+            <a:r>
+              <a:rPr lang="cs-CZ" dirty="0"/>
+              <a:t>hodnota </a:t>
+            </a:r>
+          </a:p>
+          <a:p>
+            <a:pPr lvl="1"/>
+            <a:r>
+              <a:rPr lang="cs-CZ" dirty="0"/>
+              <a:t>může obsahovat libovolný text (včetně mezer)</a:t>
+            </a:r>
+          </a:p>
+          <a:p>
+            <a:pPr lvl="1"/>
+            <a:r>
+              <a:rPr lang="cs-CZ" dirty="0"/>
+              <a:t>nemůže obsahovat element</a:t>
+            </a:r>
+          </a:p>
+          <a:p>
+            <a:pPr lvl="1"/>
+            <a:r>
+              <a:rPr lang="cs-CZ" dirty="0"/>
+              <a:t>vyhrazené znaky se vkládají</a:t>
+            </a:r>
+          </a:p>
+          <a:p>
+            <a:pPr lvl="2"/>
+            <a:r>
+              <a:rPr lang="cs-CZ" dirty="0"/>
+              <a:t>pomocí entity: &amp;</a:t>
+            </a:r>
+            <a:r>
+              <a:rPr lang="cs-CZ" dirty="0" err="1"/>
+              <a:t>apos</a:t>
+            </a:r>
+            <a:r>
+              <a:rPr lang="cs-CZ" dirty="0"/>
+              <a:t>; ('), &amp;</a:t>
+            </a:r>
+            <a:r>
+              <a:rPr lang="cs-CZ" dirty="0" err="1"/>
+              <a:t>quot</a:t>
+            </a:r>
+            <a:r>
+              <a:rPr lang="cs-CZ" dirty="0"/>
+              <a:t>; ("), &amp;</a:t>
+            </a:r>
+            <a:r>
+              <a:rPr lang="cs-CZ" dirty="0" err="1"/>
+              <a:t>lt</a:t>
+            </a:r>
+            <a:r>
+              <a:rPr lang="cs-CZ" dirty="0"/>
+              <a:t>; (&lt;), &amp;</a:t>
+            </a:r>
+            <a:r>
+              <a:rPr lang="cs-CZ" dirty="0" err="1"/>
+              <a:t>gt</a:t>
+            </a:r>
+            <a:r>
+              <a:rPr lang="cs-CZ" dirty="0"/>
+              <a:t>; (&gt;), &amp;</a:t>
+            </a:r>
+            <a:r>
+              <a:rPr lang="cs-CZ" dirty="0" err="1"/>
+              <a:t>amp</a:t>
+            </a:r>
+            <a:r>
+              <a:rPr lang="cs-CZ" dirty="0"/>
+              <a:t>; (&amp;)</a:t>
+            </a:r>
+          </a:p>
+          <a:p>
+            <a:pPr lvl="1"/>
+            <a:endParaRPr lang="cs-CZ" dirty="0"/>
+          </a:p>
+          <a:p>
+            <a:endParaRPr lang="cs-CZ" dirty="0"/>
+          </a:p>
+        </p:txBody>
+      </p:sp>
+      <p:sp>
+        <p:nvSpPr>
+          <p:cNvPr id="5" name="Zástupný text 4">
+            <a:extLst>
+              <a:ext uri="{FF2B5EF4-FFF2-40B4-BE49-F238E27FC236}">
+                <a16:creationId xmlns:a16="http://schemas.microsoft.com/office/drawing/2014/main" id="{D8020493-0E1F-4321-B419-AFA9675C64A2}"/>
+              </a:ext>
+            </a:extLst>
+          </p:cNvPr>
+          <p:cNvSpPr>
+            <a:spLocks noGrp="1"/>
+          </p:cNvSpPr>
+          <p:nvPr>
+            <p:ph type="body" sz="quarter" idx="3"/>
+          </p:nvPr>
+        </p:nvSpPr>
+        <p:spPr/>
+        <p:txBody>
+          <a:bodyPr/>
+          <a:lstStyle/>
+          <a:p>
+            <a:r>
+              <a:rPr lang="cs-CZ" dirty="0"/>
+              <a:t>příklady</a:t>
+            </a:r>
+          </a:p>
+        </p:txBody>
+      </p:sp>
+      <p:sp>
+        <p:nvSpPr>
+          <p:cNvPr id="6" name="Zástupný obsah 5">
+            <a:extLst>
+              <a:ext uri="{FF2B5EF4-FFF2-40B4-BE49-F238E27FC236}">
+                <a16:creationId xmlns:a16="http://schemas.microsoft.com/office/drawing/2014/main" id="{A91A591C-FFF8-4B18-964E-898DFB42E536}"/>
+              </a:ext>
+            </a:extLst>
+          </p:cNvPr>
+          <p:cNvSpPr>
+            <a:spLocks noGrp="1"/>
+          </p:cNvSpPr>
+          <p:nvPr>
+            <p:ph sz="quarter" idx="4"/>
+          </p:nvPr>
+        </p:nvSpPr>
+        <p:spPr>
+          <a:xfrm>
+            <a:off x="6096000" y="2505075"/>
+            <a:ext cx="5755200" cy="3789398"/>
+          </a:xfrm>
+        </p:spPr>
+        <p:txBody>
+          <a:bodyPr>
+            <a:normAutofit/>
+          </a:bodyPr>
+          <a:lstStyle/>
+          <a:p>
+            <a:pPr>
               <a:buFont typeface="Wingdings" panose="05000000000000000000" pitchFamily="2" charset="2"/>
               <a:buChar char="v"/>
             </a:pPr>
             <a:r>
-              <a:rPr lang="cs-CZ" dirty="0"/>
-              <a:t>&lt;p&gt;</a:t>
-            </a:r>
-            <a:br>
-              <a:rPr lang="cs-CZ" dirty="0"/>
-            </a:br>
-            <a:r>
-              <a:rPr lang="cs-CZ" dirty="0"/>
-              <a:t>  &lt;s&gt;Delší komentovaná </a:t>
-            </a:r>
-            <a:r>
-              <a:rPr lang="cs-CZ" b="1" dirty="0">
-                <a:solidFill>
-                  <a:srgbClr val="FF0000"/>
-                </a:solidFill>
-              </a:rPr>
-              <a:t>&lt;</a:t>
-            </a:r>
-            <a:r>
-              <a:rPr lang="cs-CZ" b="1" dirty="0" err="1">
-                <a:solidFill>
-                  <a:srgbClr val="FF0000"/>
-                </a:solidFill>
-              </a:rPr>
-              <a:t>anchor</a:t>
-            </a:r>
-            <a:r>
-              <a:rPr lang="cs-CZ" b="1" dirty="0">
-                <a:solidFill>
-                  <a:srgbClr val="FF0000"/>
+              <a:rPr lang="cs-CZ" dirty="0">
+                <a:solidFill>
+                  <a:srgbClr val="7030A0"/>
+                </a:solidFill>
+              </a:rPr>
+              <a:t>&lt;titul typ="hlavní" typ="knižní"&gt;Český snář&lt;/titul&gt; </a:t>
+            </a:r>
+            <a:r>
+              <a:rPr lang="cs-CZ" dirty="0">
+                <a:solidFill>
+                  <a:srgbClr val="7030A0"/>
+                </a:solidFill>
+                <a:sym typeface="Wingdings" panose="05000000000000000000" pitchFamily="2" charset="2"/>
+              </a:rPr>
+              <a:t></a:t>
+            </a:r>
+            <a:endParaRPr lang="cs-CZ" dirty="0">
+              <a:solidFill>
+                <a:srgbClr val="7030A0"/>
+              </a:solidFill>
+            </a:endParaRPr>
+          </a:p>
+          <a:p>
+            <a:pPr>
+              <a:buFont typeface="Wingdings" panose="05000000000000000000" pitchFamily="2" charset="2"/>
+              <a:buChar char="v"/>
+            </a:pPr>
+            <a:endParaRPr lang="cs-CZ" dirty="0"/>
+          </a:p>
+          <a:p>
+            <a:pPr>
+              <a:buFont typeface="Wingdings" panose="05000000000000000000" pitchFamily="2" charset="2"/>
+              <a:buChar char="v"/>
+            </a:pPr>
+            <a:r>
+              <a:rPr lang="cs-CZ" dirty="0">
+                <a:solidFill>
+                  <a:srgbClr val="7030A0"/>
+                </a:solidFill>
+              </a:rPr>
+              <a:t>&lt;titul překlad="&lt;</a:t>
+            </a:r>
+            <a:r>
+              <a:rPr lang="cs-CZ" dirty="0" err="1">
+                <a:solidFill>
+                  <a:srgbClr val="7030A0"/>
+                </a:solidFill>
+              </a:rPr>
+              <a:t>title</a:t>
+            </a:r>
+            <a:r>
+              <a:rPr lang="cs-CZ" dirty="0">
+                <a:solidFill>
+                  <a:srgbClr val="7030A0"/>
+                </a:solidFill>
+              </a:rPr>
+              <a:t>&gt;</a:t>
+            </a:r>
+            <a:r>
+              <a:rPr lang="cs-CZ" dirty="0" err="1">
+                <a:solidFill>
+                  <a:srgbClr val="7030A0"/>
+                </a:solidFill>
+              </a:rPr>
+              <a:t>The</a:t>
+            </a:r>
+            <a:r>
+              <a:rPr lang="cs-CZ" dirty="0">
+                <a:solidFill>
+                  <a:srgbClr val="7030A0"/>
+                </a:solidFill>
+              </a:rPr>
+              <a:t> Czech </a:t>
+            </a:r>
+            <a:r>
+              <a:rPr lang="cs-CZ" dirty="0" err="1">
+                <a:solidFill>
+                  <a:srgbClr val="7030A0"/>
+                </a:solidFill>
+              </a:rPr>
+              <a:t>Dream</a:t>
+            </a:r>
+            <a:r>
+              <a:rPr lang="cs-CZ" dirty="0">
+                <a:solidFill>
+                  <a:srgbClr val="7030A0"/>
                 </a:solidFill>
               </a:rPr>
               <a:t> </a:t>
             </a:r>
             <a:r>
-              <a:rPr lang="cs-CZ" b="1" dirty="0" err="1">
-                <a:solidFill>
-                  <a:srgbClr val="FF0000"/>
-                </a:solidFill>
-              </a:rPr>
-              <a:t>xml:id</a:t>
-            </a:r>
-            <a:r>
-              <a:rPr lang="cs-CZ" b="1" dirty="0">
-                <a:solidFill>
-                  <a:srgbClr val="FF0000"/>
-                </a:solidFill>
-              </a:rPr>
-              <a:t>="a-1" /&gt;</a:t>
-            </a:r>
-            <a:r>
-              <a:rPr lang="cs-CZ" dirty="0"/>
-              <a:t>pasáž se zvýrazněním &lt;</a:t>
+              <a:rPr lang="cs-CZ" dirty="0" err="1">
+                <a:solidFill>
+                  <a:srgbClr val="7030A0"/>
+                </a:solidFill>
+              </a:rPr>
+              <a:t>Book</a:t>
+            </a:r>
+            <a:r>
+              <a:rPr lang="cs-CZ" dirty="0">
+                <a:solidFill>
+                  <a:srgbClr val="7030A0"/>
+                </a:solidFill>
+              </a:rPr>
+              <a:t>&lt;/</a:t>
+            </a:r>
+            <a:r>
+              <a:rPr lang="cs-CZ" dirty="0" err="1">
+                <a:solidFill>
+                  <a:srgbClr val="7030A0"/>
+                </a:solidFill>
+              </a:rPr>
+              <a:t>title</a:t>
+            </a:r>
+            <a:r>
+              <a:rPr lang="cs-CZ" dirty="0">
+                <a:solidFill>
+                  <a:srgbClr val="7030A0"/>
+                </a:solidFill>
+              </a:rPr>
+              <a:t>&gt;"&gt;Český snář&lt;/titul&gt; </a:t>
+            </a:r>
+            <a:r>
+              <a:rPr lang="cs-CZ" dirty="0">
+                <a:solidFill>
+                  <a:srgbClr val="7030A0"/>
+                </a:solidFill>
+                <a:sym typeface="Wingdings" panose="05000000000000000000" pitchFamily="2" charset="2"/>
+              </a:rPr>
+              <a:t></a:t>
+            </a:r>
+            <a:endParaRPr lang="cs-CZ" dirty="0">
+              <a:solidFill>
+                <a:srgbClr val="7030A0"/>
+              </a:solidFill>
+            </a:endParaRPr>
+          </a:p>
+          <a:p>
+            <a:pPr>
+              <a:buFont typeface="Wingdings" panose="05000000000000000000" pitchFamily="2" charset="2"/>
+              <a:buChar char="v"/>
+            </a:pPr>
+            <a:r>
+              <a:rPr lang="cs-CZ" dirty="0"/>
+              <a:t>&lt;titul varianta="Bc. &amp;</a:t>
             </a:r>
             <a:r>
               <a:rPr lang="cs-CZ" dirty="0" err="1"/>
-              <a:t>hi</a:t>
-            </a:r>
-            <a:r>
-              <a:rPr lang="cs-CZ" dirty="0"/>
-              <a:t> style="</a:t>
-            </a:r>
-            <a:r>
-              <a:rPr lang="cs-CZ" dirty="0" err="1"/>
-              <a:t>italic</a:t>
-            </a:r>
-            <a:r>
-              <a:rPr lang="cs-CZ" dirty="0"/>
-              <a:t>"&gt;kurzívou&lt;/</a:t>
-            </a:r>
-            <a:r>
-              <a:rPr lang="cs-CZ" dirty="0" err="1"/>
-              <a:t>hi</a:t>
-            </a:r>
-            <a:r>
-              <a:rPr lang="cs-CZ" dirty="0"/>
-              <a:t>&gt;.</a:t>
-            </a:r>
-            <a:br>
-              <a:rPr lang="cs-CZ" dirty="0"/>
-            </a:br>
-            <a:r>
-              <a:rPr lang="cs-CZ" dirty="0"/>
-              <a:t>   &lt;/s&gt;</a:t>
-            </a:r>
-            <a:br>
-              <a:rPr lang="cs-CZ" dirty="0"/>
-            </a:br>
-            <a:r>
-              <a:rPr lang="cs-CZ" dirty="0"/>
-              <a:t>   &lt;</a:t>
-            </a:r>
-            <a:r>
-              <a:rPr lang="cs-CZ" dirty="0" err="1"/>
-              <a:t>app</a:t>
-            </a:r>
-            <a:r>
-              <a:rPr lang="cs-CZ" dirty="0"/>
-              <a:t> </a:t>
-            </a:r>
-            <a:r>
-              <a:rPr lang="cs-CZ" b="1" dirty="0" err="1">
-                <a:solidFill>
-                  <a:srgbClr val="FF0000"/>
-                </a:solidFill>
-              </a:rPr>
-              <a:t>from</a:t>
-            </a:r>
-            <a:r>
-              <a:rPr lang="cs-CZ" b="1" dirty="0">
-                <a:solidFill>
-                  <a:srgbClr val="FF0000"/>
-                </a:solidFill>
-              </a:rPr>
-              <a:t>="#a-1"</a:t>
-            </a:r>
-            <a:r>
-              <a:rPr lang="cs-CZ" dirty="0"/>
-              <a:t>&gt;</a:t>
-            </a:r>
-            <a:br>
-              <a:rPr lang="cs-CZ" dirty="0"/>
-            </a:br>
-            <a:r>
-              <a:rPr lang="cs-CZ" dirty="0"/>
-              <a:t>      &lt;</a:t>
-            </a:r>
-            <a:r>
-              <a:rPr lang="cs-CZ" dirty="0" err="1"/>
-              <a:t>note</a:t>
-            </a:r>
-            <a:r>
-              <a:rPr lang="cs-CZ" dirty="0"/>
-              <a:t>&gt;Text komentáře, který se týká úseku "pasáž se zvýrazněním kurzívou."&lt;/</a:t>
-            </a:r>
-            <a:r>
-              <a:rPr lang="cs-CZ" dirty="0" err="1"/>
-              <a:t>note</a:t>
-            </a:r>
-            <a:r>
-              <a:rPr lang="cs-CZ" dirty="0"/>
-              <a:t>&gt;</a:t>
-            </a:r>
-            <a:br>
-              <a:rPr lang="cs-CZ" dirty="0"/>
-            </a:br>
-            <a:r>
-              <a:rPr lang="cs-CZ" dirty="0"/>
-              <a:t>     &lt;/</a:t>
-            </a:r>
-            <a:r>
-              <a:rPr lang="cs-CZ" dirty="0" err="1"/>
-              <a:t>app</a:t>
-            </a:r>
-            <a:r>
-              <a:rPr lang="cs-CZ" dirty="0"/>
-              <a:t>&gt;</a:t>
-            </a:r>
-            <a:br>
-              <a:rPr lang="cs-CZ" dirty="0"/>
-            </a:br>
-            <a:r>
-              <a:rPr lang="cs-CZ" dirty="0"/>
-              <a:t> A odstavec končí.</a:t>
-            </a:r>
-            <a:br>
-              <a:rPr lang="cs-CZ" dirty="0"/>
-            </a:br>
-            <a:r>
-              <a:rPr lang="cs-CZ" dirty="0"/>
-              <a:t>&lt;/p&gt;</a:t>
-            </a:r>
-          </a:p>
-          <a:p>
-            <a:pPr lvl="2"/>
-            <a:r>
-              <a:rPr lang="cs-CZ" dirty="0"/>
-              <a:t>na začátku pasáže prázdný element s identifikátorem + odkaz na začátek pasáže v atributu @</a:t>
-            </a:r>
-            <a:r>
-              <a:rPr lang="cs-CZ" dirty="0" err="1"/>
-              <a:t>from</a:t>
-            </a:r>
-            <a:endParaRPr lang="cs-CZ" dirty="0"/>
-          </a:p>
-        </p:txBody>
-      </p:sp>
-      <p:sp>
-        <p:nvSpPr>
-          <p:cNvPr id="4" name="Zástupný symbol pro datum 3">
-            <a:extLst>
-              <a:ext uri="{FF2B5EF4-FFF2-40B4-BE49-F238E27FC236}">
-                <a16:creationId xmlns:a16="http://schemas.microsoft.com/office/drawing/2014/main" id="{577A4DDE-D2AE-447B-8214-34FD7492759B}"/>
+              <a:t>amp</a:t>
+            </a:r>
+            <a:r>
+              <a:rPr lang="cs-CZ" dirty="0"/>
+              <a:t>; Mgr."&gt;Bc. et Mgr.&lt;/titul&gt;</a:t>
+            </a:r>
+          </a:p>
+          <a:p>
+            <a:pPr>
+              <a:buFont typeface="Wingdings" panose="05000000000000000000" pitchFamily="2" charset="2"/>
+              <a:buChar char="v"/>
+            </a:pPr>
+            <a:endParaRPr lang="cs-CZ" dirty="0"/>
+          </a:p>
+        </p:txBody>
+      </p:sp>
+      <p:sp>
+        <p:nvSpPr>
+          <p:cNvPr id="7" name="Zástupný symbol pro datum 6">
+            <a:extLst>
+              <a:ext uri="{FF2B5EF4-FFF2-40B4-BE49-F238E27FC236}">
+                <a16:creationId xmlns:a16="http://schemas.microsoft.com/office/drawing/2014/main" id="{18E08B85-4550-4032-A594-4FB46CDE033C}"/>
               </a:ext>
             </a:extLst>
           </p:cNvPr>
@@ -16194,10 +16352,10 @@
       </p:sp>
       <p:sp>
         <p:nvSpPr>
-          <p:cNvPr id="5" name="Zástupný symbol pro číslo snímku 4">
-            <a:extLst>
-              <a:ext uri="{FF2B5EF4-FFF2-40B4-BE49-F238E27FC236}">
-                <a16:creationId xmlns:a16="http://schemas.microsoft.com/office/drawing/2014/main" id="{4CF299EE-D0B1-4092-83BF-7E17100F2D2F}"/>
+          <p:cNvPr id="8" name="Zástupný symbol pro číslo snímku 7">
+            <a:extLst>
+              <a:ext uri="{FF2B5EF4-FFF2-40B4-BE49-F238E27FC236}">
+                <a16:creationId xmlns:a16="http://schemas.microsoft.com/office/drawing/2014/main" id="{4E2C9467-A938-42DE-901E-A889A05A0C32}"/>
               </a:ext>
             </a:extLst>
           </p:cNvPr>
@@ -16223,10 +16381,10 @@
       </p:sp>
       <p:sp>
         <p:nvSpPr>
-          <p:cNvPr id="6" name="Zástupný symbol pro zápatí 5">
-            <a:extLst>
-              <a:ext uri="{FF2B5EF4-FFF2-40B4-BE49-F238E27FC236}">
-                <a16:creationId xmlns:a16="http://schemas.microsoft.com/office/drawing/2014/main" id="{8070006A-7C91-494B-A1C1-AF3653BEAF6D}"/>
+          <p:cNvPr id="9" name="Zástupný symbol pro zápatí 8">
+            <a:extLst>
+              <a:ext uri="{FF2B5EF4-FFF2-40B4-BE49-F238E27FC236}">
+                <a16:creationId xmlns:a16="http://schemas.microsoft.com/office/drawing/2014/main" id="{3533B480-8B64-4355-BC56-7262BEFB9A03}"/>
               </a:ext>
             </a:extLst>
           </p:cNvPr>
@@ -16253,7 +16411,7 @@
     </p:spTree>
     <p:extLst>
       <p:ext uri="{BB962C8B-B14F-4D97-AF65-F5344CB8AC3E}">
-        <p14:creationId xmlns:p14="http://schemas.microsoft.com/office/powerpoint/2010/main" val="2039023402"/>
+        <p14:creationId xmlns:p14="http://schemas.microsoft.com/office/powerpoint/2010/main" val="1053685828"/>
       </p:ext>
     </p:extLst>
   </p:cSld>
@@ -16282,10 +16440,10 @@
       </p:grpSpPr>
       <p:sp>
         <p:nvSpPr>
-          <p:cNvPr id="2" name="Nadpis 1">
-            <a:extLst>
-              <a:ext uri="{FF2B5EF4-FFF2-40B4-BE49-F238E27FC236}">
-                <a16:creationId xmlns:a16="http://schemas.microsoft.com/office/drawing/2014/main" id="{AA2FD737-6EF6-4588-8139-9D80FBB00749}"/>
+          <p:cNvPr id="9" name="Nadpis 8">
+            <a:extLst>
+              <a:ext uri="{FF2B5EF4-FFF2-40B4-BE49-F238E27FC236}">
+                <a16:creationId xmlns:a16="http://schemas.microsoft.com/office/drawing/2014/main" id="{95099A30-0979-4D93-9518-1F0CAD491C82}"/>
               </a:ext>
             </a:extLst>
           </p:cNvPr>
@@ -16303,228 +16461,31 @@
           <a:p>
             <a:r>
               <a:rPr lang="cs-CZ" dirty="0"/>
-              <a:t>Základní části dokumentu XML, atributy</a:t>
-            </a:r>
-          </a:p>
-        </p:txBody>
-      </p:sp>
-      <p:sp>
-        <p:nvSpPr>
-          <p:cNvPr id="3" name="Zástupný text 2">
-            <a:extLst>
-              <a:ext uri="{FF2B5EF4-FFF2-40B4-BE49-F238E27FC236}">
-                <a16:creationId xmlns:a16="http://schemas.microsoft.com/office/drawing/2014/main" id="{EAE0A3D3-6250-4BED-8697-E2A10239BA10}"/>
-              </a:ext>
-            </a:extLst>
-          </p:cNvPr>
-          <p:cNvSpPr>
-            <a:spLocks noGrp="1"/>
-          </p:cNvSpPr>
-          <p:nvPr>
-            <p:ph type="body" idx="1"/>
+              <a:t>Základní části dokumentu XML, atributy III</a:t>
+            </a:r>
+          </a:p>
+        </p:txBody>
+      </p:sp>
+      <p:sp>
+        <p:nvSpPr>
+          <p:cNvPr id="10" name="Zástupný obsah 9">
+            <a:extLst>
+              <a:ext uri="{FF2B5EF4-FFF2-40B4-BE49-F238E27FC236}">
+                <a16:creationId xmlns:a16="http://schemas.microsoft.com/office/drawing/2014/main" id="{88A3F858-65CF-4E00-93E5-DA03EAAF744A}"/>
+              </a:ext>
+            </a:extLst>
+          </p:cNvPr>
+          <p:cNvSpPr>
+            <a:spLocks noGrp="1"/>
+          </p:cNvSpPr>
+          <p:nvPr>
+            <p:ph idx="1"/>
           </p:nvPr>
         </p:nvSpPr>
         <p:spPr/>
         <p:txBody>
           <a:bodyPr/>
           <a:lstStyle/>
-          <a:p>
-            <a:r>
-              <a:rPr lang="cs-CZ" dirty="0"/>
-              <a:t>atribut</a:t>
-            </a:r>
-          </a:p>
-        </p:txBody>
-      </p:sp>
-      <p:sp>
-        <p:nvSpPr>
-          <p:cNvPr id="4" name="Zástupný obsah 3">
-            <a:extLst>
-              <a:ext uri="{FF2B5EF4-FFF2-40B4-BE49-F238E27FC236}">
-                <a16:creationId xmlns:a16="http://schemas.microsoft.com/office/drawing/2014/main" id="{9A80166F-C925-4EAA-8A47-E3DF57FABDD4}"/>
-              </a:ext>
-            </a:extLst>
-          </p:cNvPr>
-          <p:cNvSpPr>
-            <a:spLocks noGrp="1"/>
-          </p:cNvSpPr>
-          <p:nvPr>
-            <p:ph sz="half" idx="2"/>
-          </p:nvPr>
-        </p:nvSpPr>
-        <p:spPr>
-          <a:xfrm>
-            <a:off x="360000" y="2505074"/>
-            <a:ext cx="5637575" cy="3789399"/>
-          </a:xfrm>
-        </p:spPr>
-        <p:txBody>
-          <a:bodyPr>
-            <a:normAutofit fontScale="92500"/>
-          </a:bodyPr>
-          <a:lstStyle/>
-          <a:p>
-            <a:r>
-              <a:rPr lang="cs-CZ" dirty="0"/>
-              <a:t>doplňuje k elementu další informace</a:t>
-            </a:r>
-          </a:p>
-          <a:p>
-            <a:r>
-              <a:rPr lang="cs-CZ" dirty="0"/>
-              <a:t>tvoří ho</a:t>
-            </a:r>
-          </a:p>
-          <a:p>
-            <a:pPr lvl="1"/>
-            <a:r>
-              <a:rPr lang="cs-CZ" dirty="0"/>
-              <a:t>název atributu</a:t>
-            </a:r>
-          </a:p>
-          <a:p>
-            <a:pPr lvl="1"/>
-            <a:r>
-              <a:rPr lang="cs-CZ" dirty="0"/>
-              <a:t>=</a:t>
-            </a:r>
-          </a:p>
-          <a:p>
-            <a:pPr lvl="1"/>
-            <a:r>
-              <a:rPr lang="cs-CZ" dirty="0"/>
-              <a:t>hodnota (v uvozovkách: " nebo ')</a:t>
-            </a:r>
-          </a:p>
-          <a:p>
-            <a:pPr lvl="2"/>
-            <a:r>
-              <a:rPr lang="cs-CZ" dirty="0"/>
-              <a:t>" a ' se hodí při dotazování: </a:t>
-            </a:r>
-            <a:r>
-              <a:rPr lang="cs-CZ" dirty="0" err="1"/>
-              <a:t>XPath</a:t>
-            </a:r>
-            <a:endParaRPr lang="cs-CZ" dirty="0"/>
-          </a:p>
-          <a:p>
-            <a:r>
-              <a:rPr lang="cs-CZ" dirty="0"/>
-              <a:t>je součástí </a:t>
-            </a:r>
-            <a:r>
-              <a:rPr lang="cs-CZ" b="1" dirty="0"/>
-              <a:t>počáteční</a:t>
-            </a:r>
-            <a:r>
-              <a:rPr lang="cs-CZ" dirty="0"/>
-              <a:t> značky elementu</a:t>
-            </a:r>
-          </a:p>
-          <a:p>
-            <a:r>
-              <a:rPr lang="cs-CZ" dirty="0"/>
-              <a:t>více atributů se odděluje mezerou</a:t>
-            </a:r>
-          </a:p>
-          <a:p>
-            <a:endParaRPr lang="cs-CZ" dirty="0"/>
-          </a:p>
-        </p:txBody>
-      </p:sp>
-      <p:sp>
-        <p:nvSpPr>
-          <p:cNvPr id="5" name="Zástupný text 4">
-            <a:extLst>
-              <a:ext uri="{FF2B5EF4-FFF2-40B4-BE49-F238E27FC236}">
-                <a16:creationId xmlns:a16="http://schemas.microsoft.com/office/drawing/2014/main" id="{D8020493-0E1F-4321-B419-AFA9675C64A2}"/>
-              </a:ext>
-            </a:extLst>
-          </p:cNvPr>
-          <p:cNvSpPr>
-            <a:spLocks noGrp="1"/>
-          </p:cNvSpPr>
-          <p:nvPr>
-            <p:ph type="body" sz="quarter" idx="3"/>
-          </p:nvPr>
-        </p:nvSpPr>
-        <p:spPr/>
-        <p:txBody>
-          <a:bodyPr/>
-          <a:lstStyle/>
-          <a:p>
-            <a:r>
-              <a:rPr lang="cs-CZ" dirty="0"/>
-              <a:t>příklady</a:t>
-            </a:r>
-          </a:p>
-        </p:txBody>
-      </p:sp>
-      <p:sp>
-        <p:nvSpPr>
-          <p:cNvPr id="6" name="Zástupný obsah 5">
-            <a:extLst>
-              <a:ext uri="{FF2B5EF4-FFF2-40B4-BE49-F238E27FC236}">
-                <a16:creationId xmlns:a16="http://schemas.microsoft.com/office/drawing/2014/main" id="{A91A591C-FFF8-4B18-964E-898DFB42E536}"/>
-              </a:ext>
-            </a:extLst>
-          </p:cNvPr>
-          <p:cNvSpPr>
-            <a:spLocks noGrp="1"/>
-          </p:cNvSpPr>
-          <p:nvPr>
-            <p:ph sz="quarter" idx="4"/>
-          </p:nvPr>
-        </p:nvSpPr>
-        <p:spPr>
-          <a:xfrm>
-            <a:off x="6096000" y="2505075"/>
-            <a:ext cx="5755200" cy="3789398"/>
-          </a:xfrm>
-        </p:spPr>
-        <p:txBody>
-          <a:bodyPr>
-            <a:noAutofit/>
-          </a:bodyPr>
-          <a:lstStyle/>
-          <a:p>
-            <a:pPr>
-              <a:buFont typeface="Wingdings" panose="05000000000000000000" pitchFamily="2" charset="2"/>
-              <a:buChar char="v"/>
-            </a:pPr>
-            <a:r>
-              <a:rPr lang="cs-CZ" sz="2000" dirty="0"/>
-              <a:t>&lt;titul typ="hlavní"&gt;Český snář&lt;/titul&gt;</a:t>
-            </a:r>
-          </a:p>
-          <a:p>
-            <a:pPr>
-              <a:buFont typeface="Wingdings" panose="05000000000000000000" pitchFamily="2" charset="2"/>
-              <a:buChar char="v"/>
-            </a:pPr>
-            <a:endParaRPr lang="cs-CZ" sz="2000" dirty="0"/>
-          </a:p>
-          <a:p>
-            <a:pPr>
-              <a:buFont typeface="Wingdings" panose="05000000000000000000" pitchFamily="2" charset="2"/>
-              <a:buChar char="v"/>
-            </a:pPr>
-            <a:r>
-              <a:rPr lang="cs-CZ" sz="2000" dirty="0"/>
-              <a:t>&lt;titul typ="vysokoškolský"&gt;Mgr.&lt;/titul&gt;</a:t>
-            </a:r>
-          </a:p>
-          <a:p>
-            <a:pPr>
-              <a:buFont typeface="Wingdings" panose="05000000000000000000" pitchFamily="2" charset="2"/>
-              <a:buChar char="v"/>
-            </a:pPr>
-            <a:r>
-              <a:rPr lang="cs-CZ" sz="2000" dirty="0"/>
-              <a:t>&lt;titul typ='vysokoškolský'&gt;Mgr.&lt;/titul&gt;</a:t>
-            </a:r>
-          </a:p>
           <a:p>
             <a:pPr lvl="0">
               <a:buClr>
@@ -16533,39 +16494,48 @@
                 </a:srgbClr>
               </a:buClr>
             </a:pPr>
-            <a:endParaRPr lang="cs-CZ" dirty="0">
-              <a:solidFill>
-                <a:prstClr val="black"/>
-              </a:solidFill>
-            </a:endParaRPr>
-          </a:p>
-          <a:p>
-            <a:pPr>
-              <a:buFont typeface="Wingdings" panose="05000000000000000000" pitchFamily="2" charset="2"/>
-              <a:buChar char="v"/>
+            <a:r>
+              <a:rPr lang="cs-CZ" dirty="0">
+                <a:solidFill>
+                  <a:prstClr val="black"/>
+                </a:solidFill>
+              </a:rPr>
+              <a:t>nezáleží na pořadí</a:t>
+            </a:r>
+          </a:p>
+          <a:p>
+            <a:pPr lvl="1">
+              <a:buClr>
+                <a:srgbClr val="4472C4">
+                  <a:lumMod val="75000"/>
+                </a:srgbClr>
+              </a:buClr>
             </a:pPr>
             <a:r>
-              <a:rPr lang="cs-CZ" sz="2000" dirty="0">
-                <a:solidFill>
-                  <a:srgbClr val="7030A0"/>
-                </a:solidFill>
-              </a:rPr>
-              <a:t>&lt;titul&gt;Český snář&lt;/titul typ="hlavní"&gt; </a:t>
-            </a:r>
-            <a:r>
-              <a:rPr lang="cs-CZ" sz="2000" dirty="0">
-                <a:solidFill>
-                  <a:srgbClr val="7030A0"/>
-                </a:solidFill>
-                <a:sym typeface="Wingdings" panose="05000000000000000000" pitchFamily="2" charset="2"/>
-              </a:rPr>
-              <a:t></a:t>
-            </a:r>
-            <a:endParaRPr lang="cs-CZ" sz="2000" dirty="0">
-              <a:solidFill>
-                <a:srgbClr val="7030A0"/>
-              </a:solidFill>
-            </a:endParaRPr>
+              <a:rPr lang="cs-CZ" dirty="0">
+                <a:solidFill>
+                  <a:prstClr val="black"/>
+                </a:solidFill>
+              </a:rPr>
+              <a:t>pořadí atributů v rámci značky může být libovolné</a:t>
+            </a:r>
+          </a:p>
+          <a:p>
+            <a:pPr lvl="2">
+              <a:buClr>
+                <a:srgbClr val="4472C4">
+                  <a:lumMod val="75000"/>
+                </a:srgbClr>
+              </a:buClr>
+            </a:pPr>
+            <a:r>
+              <a:rPr lang="cs-CZ" dirty="0">
+                <a:solidFill>
+                  <a:prstClr val="black"/>
+                </a:solidFill>
+              </a:rPr>
+              <a:t>někdy s pevně daným pořadím počítají programy pro zpracování XML, je však lepší řídit se názvem</a:t>
+            </a:r>
           </a:p>
           <a:p>
             <a:pPr lvl="0">
@@ -16574,67 +16544,101 @@
                   <a:lumMod val="75000"/>
                 </a:srgbClr>
               </a:buClr>
-              <a:buFont typeface="Wingdings" panose="05000000000000000000" pitchFamily="2" charset="2"/>
-              <a:buChar char="v"/>
             </a:pPr>
-            <a:endParaRPr lang="cs-CZ" sz="2100" dirty="0">
-              <a:solidFill>
-                <a:prstClr val="black"/>
-              </a:solidFill>
-            </a:endParaRPr>
-          </a:p>
-          <a:p>
-            <a:pPr lvl="0">
+            <a:r>
+              <a:rPr lang="cs-CZ" dirty="0">
+                <a:solidFill>
+                  <a:prstClr val="black"/>
+                </a:solidFill>
+              </a:rPr>
+              <a:t>konvence</a:t>
+            </a:r>
+          </a:p>
+          <a:p>
+            <a:pPr lvl="1">
               <a:buClr>
                 <a:srgbClr val="4472C4">
                   <a:lumMod val="75000"/>
                 </a:srgbClr>
               </a:buClr>
-              <a:buFont typeface="Wingdings" panose="05000000000000000000" pitchFamily="2" charset="2"/>
-              <a:buChar char="v"/>
             </a:pPr>
             <a:r>
-              <a:rPr lang="cs-CZ" sz="2100" dirty="0">
+              <a:rPr lang="cs-CZ" dirty="0">
                 <a:solidFill>
                   <a:prstClr val="black"/>
                 </a:solidFill>
               </a:rPr>
-              <a:t>&lt;div n="1" type="</a:t>
-            </a:r>
-            <a:r>
-              <a:rPr lang="cs-CZ" sz="2100" dirty="0" err="1">
+              <a:t>v prezentaci názvy atributu s @ (@n)</a:t>
+            </a:r>
+          </a:p>
+          <a:p>
+            <a:pPr lvl="2">
+              <a:buClr>
+                <a:srgbClr val="4472C4">
+                  <a:lumMod val="75000"/>
+                </a:srgbClr>
+              </a:buClr>
+            </a:pPr>
+            <a:r>
+              <a:rPr lang="cs-CZ" dirty="0">
                 <a:solidFill>
                   <a:prstClr val="black"/>
                 </a:solidFill>
               </a:rPr>
-              <a:t>foreword</a:t>
-            </a:r>
-            <a:r>
-              <a:rPr lang="cs-CZ" sz="2100" dirty="0">
+              <a:t>v XML se používá bez @ (&lt;div n="1"&gt;)</a:t>
+            </a:r>
+          </a:p>
+          <a:p>
+            <a:pPr lvl="2">
+              <a:buClr>
+                <a:srgbClr val="4472C4">
+                  <a:lumMod val="75000"/>
+                </a:srgbClr>
+              </a:buClr>
+            </a:pPr>
+            <a:r>
+              <a:rPr lang="cs-CZ" dirty="0">
                 <a:solidFill>
                   <a:prstClr val="black"/>
                 </a:solidFill>
               </a:rPr>
-              <a:t>"&gt;…&lt;/div&gt;</a:t>
-            </a:r>
-            <a:endParaRPr lang="cs-CZ" dirty="0">
-              <a:solidFill>
-                <a:prstClr val="black"/>
-              </a:solidFill>
-            </a:endParaRPr>
-          </a:p>
-          <a:p>
-            <a:pPr>
-              <a:buFont typeface="Wingdings" panose="05000000000000000000" pitchFamily="2" charset="2"/>
-              <a:buChar char="v"/>
+              <a:t>s @ se používá v </a:t>
+            </a:r>
+            <a:r>
+              <a:rPr lang="cs-CZ" dirty="0" err="1">
+                <a:solidFill>
+                  <a:prstClr val="black"/>
+                </a:solidFill>
+              </a:rPr>
+              <a:t>XPath</a:t>
+            </a:r>
+            <a:r>
+              <a:rPr lang="cs-CZ" dirty="0">
+                <a:solidFill>
+                  <a:prstClr val="black"/>
+                </a:solidFill>
+              </a:rPr>
+              <a:t> ("p[@n]")</a:t>
+            </a:r>
+          </a:p>
+          <a:p>
+            <a:pPr lvl="1">
+              <a:buClr>
+                <a:srgbClr val="4472C4">
+                  <a:lumMod val="75000"/>
+                </a:srgbClr>
+              </a:buClr>
             </a:pPr>
-            <a:endParaRPr lang="cs-CZ" sz="2400" dirty="0"/>
-          </a:p>
-          <a:p>
-            <a:pPr>
-              <a:buFont typeface="Wingdings" panose="05000000000000000000" pitchFamily="2" charset="2"/>
-              <a:buChar char="v"/>
-            </a:pPr>
+            <a:r>
+              <a:rPr lang="cs-CZ" dirty="0">
+                <a:solidFill>
+                  <a:prstClr val="black"/>
+                </a:solidFill>
+              </a:rPr>
+              <a:t>pro rozlišení od názvu elementu (bez @)</a:t>
+            </a:r>
+          </a:p>
+          <a:p>
             <a:endParaRPr lang="cs-CZ" dirty="0"/>
           </a:p>
         </p:txBody>
@@ -16644,7 +16648,7 @@
           <p:cNvPr id="7" name="Zástupný symbol pro datum 6">
             <a:extLst>
               <a:ext uri="{FF2B5EF4-FFF2-40B4-BE49-F238E27FC236}">
-                <a16:creationId xmlns:a16="http://schemas.microsoft.com/office/drawing/2014/main" id="{18E08B85-4550-4032-A594-4FB46CDE033C}"/>
+                <a16:creationId xmlns:a16="http://schemas.microsoft.com/office/drawing/2014/main" id="{A328A056-3756-421E-8CF1-47D78ECC3B1C}"/>
               </a:ext>
             </a:extLst>
           </p:cNvPr>
@@ -16673,7 +16677,7 @@
           <p:cNvPr id="8" name="Zástupný symbol pro číslo snímku 7">
             <a:extLst>
               <a:ext uri="{FF2B5EF4-FFF2-40B4-BE49-F238E27FC236}">
-                <a16:creationId xmlns:a16="http://schemas.microsoft.com/office/drawing/2014/main" id="{4E2C9467-A938-42DE-901E-A889A05A0C32}"/>
+                <a16:creationId xmlns:a16="http://schemas.microsoft.com/office/drawing/2014/main" id="{913983A7-E3FD-4D44-BB86-E2D7932C32AB}"/>
               </a:ext>
             </a:extLst>
           </p:cNvPr>
@@ -16699,10 +16703,10 @@
       </p:sp>
       <p:sp>
         <p:nvSpPr>
-          <p:cNvPr id="9" name="Zástupný symbol pro zápatí 8">
-            <a:extLst>
-              <a:ext uri="{FF2B5EF4-FFF2-40B4-BE49-F238E27FC236}">
-                <a16:creationId xmlns:a16="http://schemas.microsoft.com/office/drawing/2014/main" id="{B3BF42B1-0984-4D32-91BA-AEA9FDF4020C}"/>
+          <p:cNvPr id="2" name="Zástupný symbol pro zápatí 1">
+            <a:extLst>
+              <a:ext uri="{FF2B5EF4-FFF2-40B4-BE49-F238E27FC236}">
+                <a16:creationId xmlns:a16="http://schemas.microsoft.com/office/drawing/2014/main" id="{435AC780-DE3B-4791-AEA1-37FE5358FE3C}"/>
               </a:ext>
             </a:extLst>
           </p:cNvPr>
@@ -16729,7 +16733,7 @@
     </p:spTree>
     <p:extLst>
       <p:ext uri="{BB962C8B-B14F-4D97-AF65-F5344CB8AC3E}">
-        <p14:creationId xmlns:p14="http://schemas.microsoft.com/office/powerpoint/2010/main" val="1067496593"/>
+        <p14:creationId xmlns:p14="http://schemas.microsoft.com/office/powerpoint/2010/main" val="302397376"/>
       </p:ext>
     </p:extLst>
   </p:cSld>

</xml_diff>

<commit_message>
věcná oprava (XSLT >> XML)
</commit_message>
<xml_diff>
--- a/Presentations/02-RIDICS_Zaklady-XML-TEI-XML.pptx
+++ b/Presentations/02-RIDICS_Zaklady-XML-TEI-XML.pptx
@@ -12475,7 +12475,15 @@
             <a:pPr lvl="1"/>
             <a:r>
               <a:rPr lang="cs-CZ" dirty="0"/>
-              <a:t>slouží k transformaci XSLT na jiné formáty (HTML, XML, </a:t>
+              <a:t>slouží k </a:t>
+            </a:r>
+            <a:r>
+              <a:rPr lang="cs-CZ"/>
+              <a:t>transformaci XML </a:t>
+            </a:r>
+            <a:r>
+              <a:rPr lang="cs-CZ" dirty="0"/>
+              <a:t>na jiné formáty (HTML, XML, </a:t>
             </a:r>
             <a:r>
               <a:rPr lang="cs-CZ" dirty="0" err="1"/>

</xml_diff>